<commit_message>
added OSF and fixed typos
</commit_message>
<xml_diff>
--- a/instructors/06-Repositories_v3.1.pptx
+++ b/instructors/06-Repositories_v3.1.pptx
@@ -220,7 +220,7 @@
           <a:p>
             <a:fld id="{585C48AE-4A1E-9A43-835F-510354165F99}" type="datetimeFigureOut">
               <a:rPr lang="en-GB" smtClean="0"/>
-              <a:t>01/03/2024</a:t>
+              <a:t>21/03/2024</a:t>
             </a:fld>
             <a:endParaRPr lang="en-GB"/>
           </a:p>
@@ -676,8 +676,12 @@
           <a:lstStyle/>
           <a:p>
             <a:r>
+              <a:rPr lang="en-GB" b="1" dirty="0"/>
+              <a:t>Dryad</a:t>
+            </a:r>
+            <a:r>
               <a:rPr lang="en-GB" dirty="0"/>
-              <a:t>Dryad is an international open-access repository of research data.  It is a </a:t>
+              <a:t> is an international open-access repository of research data.  It is a </a:t>
             </a:r>
             <a:r>
               <a:rPr lang="en-GB" dirty="0" err="1"/>
@@ -685,8 +689,21 @@
             </a:r>
             <a:r>
               <a:rPr lang="en-GB" dirty="0"/>
-              <a:t> organization that provides long-term access to its contents at no cost to users. The base DPC per data submission is $150 USD. </a:t>
-            </a:r>
+              <a:t> organization that provides long-term access to its contents at no cost to users. The base DPC per data submission is $150 USD unless </a:t>
+            </a:r>
+            <a:r>
+              <a:rPr lang="en-GB" b="0" i="0" dirty="0">
+                <a:solidFill>
+                  <a:srgbClr val="1E1E1E"/>
+                </a:solidFill>
+                <a:effectLst/>
+                <a:latin typeface="Roboto Slab"/>
+              </a:rPr>
+              <a:t>funded by the institution, publishers or funders.</a:t>
+            </a:r>
+            <a:endParaRPr lang="en-GB" dirty="0"/>
+          </a:p>
+          <a:p>
             <a:r>
               <a:rPr lang="en-GB" sz="1200" b="0" i="0" kern="1200" dirty="0">
                 <a:solidFill>
@@ -726,7 +743,7 @@
             </a:r>
             <a:r>
               <a:rPr lang="en-GB" dirty="0"/>
-              <a:t> Access is free.</a:t>
+              <a:t> Access is free. </a:t>
             </a:r>
           </a:p>
           <a:p>
@@ -734,12 +751,12 @@
           </a:p>
           <a:p>
             <a:r>
-              <a:rPr lang="en-GB" dirty="0" err="1"/>
-              <a:t>Zenodo</a:t>
+              <a:rPr lang="en-GB" b="1" dirty="0"/>
+              <a:t>Zenodo </a:t>
             </a:r>
             <a:r>
               <a:rPr lang="en-GB" dirty="0"/>
-              <a:t> built and operated by CERN and </a:t>
+              <a:t>built and operated by CERN and </a:t>
             </a:r>
             <a:r>
               <a:rPr lang="en-GB" dirty="0" err="1"/>
@@ -747,7 +764,21 @@
             </a:r>
             <a:r>
               <a:rPr lang="en-GB" dirty="0"/>
-              <a:t> to ensure that everyone can join in Open Science.</a:t>
+              <a:t> to ensure that everyone can join in Open Science. Free, up to 50 GB per dataset, </a:t>
+            </a:r>
+            <a:r>
+              <a:rPr lang="en-GB" b="0" i="0" dirty="0">
+                <a:solidFill>
+                  <a:srgbClr val="1E1E1E"/>
+                </a:solidFill>
+                <a:effectLst/>
+                <a:latin typeface="Roboto Slab"/>
+              </a:rPr>
+              <a:t>Higher quotas can be requested and granted on a case-by-case basis. </a:t>
+            </a:r>
+            <a:r>
+              <a:rPr lang="en-GB" dirty="0"/>
+              <a:t>but you can upload several datasets, no size limits. </a:t>
             </a:r>
           </a:p>
           <a:p>
@@ -755,34 +786,255 @@
           </a:p>
           <a:p>
             <a:r>
-              <a:rPr lang="en-GB" dirty="0" err="1"/>
+              <a:rPr lang="en-GB" b="1" dirty="0"/>
               <a:t>Figshare</a:t>
             </a:r>
             <a:r>
               <a:rPr lang="en-GB" dirty="0"/>
-              <a:t> is an online open access repository where researchers can preserve and share their research outputs, including figures, datasets, images, and videos. It is free to upload content and free to access, in adherence to the principle of open data. </a:t>
-            </a:r>
-            <a:r>
-              <a:rPr lang="en-GB" dirty="0" err="1"/>
-              <a:t>Figshare</a:t>
+              <a:t> is an online open access repository free to upload content and free to access – upload up to 20 GB.  of open data. Company supported by Digital Science, a subsidiary of Springer Nature. </a:t>
+            </a:r>
+            <a:r>
+              <a:rPr lang="en-GB" b="1" i="0" dirty="0">
+                <a:solidFill>
+                  <a:srgbClr val="464646"/>
+                </a:solidFill>
+                <a:effectLst/>
+                <a:latin typeface="Arial" panose="020B0604020202020204" pitchFamily="34" charset="0"/>
+              </a:rPr>
+              <a:t>100GB = $450 but can upload up 2TB if you pay 7.000 or more. </a:t>
+            </a:r>
+          </a:p>
+          <a:p>
+            <a:endParaRPr lang="en-GB" dirty="0"/>
+          </a:p>
+          <a:p>
+            <a:r>
+              <a:rPr lang="en-GB" b="1" dirty="0" err="1"/>
+              <a:t>Dataverse</a:t>
             </a:r>
             <a:r>
               <a:rPr lang="en-GB" dirty="0"/>
-              <a:t> is one of a number of portfolio businesses supported by Digital Science, a subsidiary of Springer Nature.</a:t>
-            </a:r>
-          </a:p>
-          <a:p>
+              <a:t> is funded by Harvard with additional support from the Alfred P. Sloan Foundation, National Science Foundation, National Institutes of Health, Helmsley Charitable Trust, IQSS's Henry A. Murray Research Archive, and many others. </a:t>
+            </a:r>
+          </a:p>
+          <a:p>
+            <a:pPr marL="0" marR="0" lvl="0" indent="0" algn="l" defTabSz="914400" rtl="0" eaLnBrk="1" fontAlgn="auto" latinLnBrk="0" hangingPunct="1">
+              <a:lnSpc>
+                <a:spcPct val="100000"/>
+              </a:lnSpc>
+              <a:spcBef>
+                <a:spcPts val="0"/>
+              </a:spcBef>
+              <a:spcAft>
+                <a:spcPts val="0"/>
+              </a:spcAft>
+              <a:buClrTx/>
+              <a:buSzTx/>
+              <a:buFontTx/>
+              <a:buNone/>
+              <a:tabLst/>
+              <a:defRPr/>
+            </a:pPr>
+            <a:r>
+              <a:rPr lang="en-GB" b="0" i="0" dirty="0">
+                <a:solidFill>
+                  <a:srgbClr val="1E1E1E"/>
+                </a:solidFill>
+                <a:effectLst/>
+                <a:latin typeface="Roboto Slab"/>
+              </a:rPr>
+              <a:t>Harvard </a:t>
+            </a:r>
+            <a:r>
+              <a:rPr lang="en-GB" b="0" i="0" dirty="0" err="1">
+                <a:solidFill>
+                  <a:srgbClr val="1E1E1E"/>
+                </a:solidFill>
+                <a:effectLst/>
+                <a:latin typeface="Roboto Slab"/>
+              </a:rPr>
+              <a:t>Dataverse</a:t>
+            </a:r>
+            <a:r>
+              <a:rPr lang="en-GB" b="0" i="0" dirty="0">
+                <a:solidFill>
+                  <a:srgbClr val="1E1E1E"/>
+                </a:solidFill>
+                <a:effectLst/>
+                <a:latin typeface="Roboto Slab"/>
+              </a:rPr>
+              <a:t> Repository is </a:t>
+            </a:r>
+            <a:r>
+              <a:rPr lang="en-GB" b="1" i="0" dirty="0">
+                <a:solidFill>
+                  <a:srgbClr val="1E1E1E"/>
+                </a:solidFill>
+                <a:effectLst/>
+                <a:latin typeface="Roboto Slab"/>
+              </a:rPr>
+              <a:t>free for all researchers worldwide (up to 1 TB). </a:t>
+            </a:r>
+            <a:r>
+              <a:rPr lang="en-GB" b="0" i="0" dirty="0">
+                <a:solidFill>
+                  <a:srgbClr val="1E1E1E"/>
+                </a:solidFill>
+                <a:effectLst/>
+                <a:latin typeface="Roboto Slab"/>
+              </a:rPr>
+              <a:t>Provides free consultation and paid curation services to help collection managers develop their collections to ensure FAIR deposit of content</a:t>
+            </a:r>
+          </a:p>
+          <a:p>
+            <a:pPr marL="0" marR="0" lvl="0" indent="0" algn="l" defTabSz="914400" rtl="0" eaLnBrk="1" fontAlgn="auto" latinLnBrk="0" hangingPunct="1">
+              <a:lnSpc>
+                <a:spcPct val="100000"/>
+              </a:lnSpc>
+              <a:spcBef>
+                <a:spcPts val="0"/>
+              </a:spcBef>
+              <a:spcAft>
+                <a:spcPts val="0"/>
+              </a:spcAft>
+              <a:buClrTx/>
+              <a:buSzTx/>
+              <a:buFontTx/>
+              <a:buNone/>
+              <a:tabLst/>
+              <a:defRPr/>
+            </a:pPr>
             <a:endParaRPr lang="en-GB" dirty="0"/>
           </a:p>
           <a:p>
+            <a:pPr marL="0" marR="0" lvl="0" indent="0" algn="l" defTabSz="914400" rtl="0" eaLnBrk="1" fontAlgn="auto" latinLnBrk="0" hangingPunct="1">
+              <a:lnSpc>
+                <a:spcPct val="100000"/>
+              </a:lnSpc>
+              <a:spcBef>
+                <a:spcPts val="0"/>
+              </a:spcBef>
+              <a:spcAft>
+                <a:spcPts val="0"/>
+              </a:spcAft>
+              <a:buClrTx/>
+              <a:buSzTx/>
+              <a:buFontTx/>
+              <a:buNone/>
+              <a:tabLst/>
+              <a:defRPr/>
+            </a:pPr>
+            <a:r>
+              <a:rPr lang="en-GB" b="1" dirty="0"/>
+              <a:t>OSF:</a:t>
+            </a:r>
+            <a:r>
+              <a:rPr lang="en-GB" dirty="0"/>
+              <a:t> </a:t>
+            </a:r>
+            <a:r>
+              <a:rPr lang="en-GB" b="0" i="0" dirty="0">
+                <a:solidFill>
+                  <a:srgbClr val="FFFFFF"/>
+                </a:solidFill>
+                <a:effectLst/>
+                <a:latin typeface="Open Sans" panose="020B0606030504020204" pitchFamily="34" charset="0"/>
+              </a:rPr>
+              <a:t>free, open platform to share projects, preprints or datasets. </a:t>
+            </a:r>
+            <a:r>
+              <a:rPr lang="en-GB" b="1" i="0" dirty="0">
+                <a:solidFill>
+                  <a:srgbClr val="1E1E1E"/>
+                </a:solidFill>
+                <a:effectLst/>
+                <a:latin typeface="Roboto Slab"/>
+              </a:rPr>
+              <a:t>Public Projects Storage Limit</a:t>
+            </a:r>
+            <a:r>
+              <a:rPr lang="en-GB" b="0" i="0" dirty="0">
+                <a:solidFill>
+                  <a:srgbClr val="1E1E1E"/>
+                </a:solidFill>
+                <a:effectLst/>
+                <a:latin typeface="Roboto Slab"/>
+              </a:rPr>
+              <a:t>: </a:t>
+            </a:r>
+            <a:r>
+              <a:rPr lang="en-GB" b="1" i="0" dirty="0">
+                <a:solidFill>
+                  <a:srgbClr val="1E1E1E"/>
+                </a:solidFill>
+                <a:effectLst/>
+                <a:latin typeface="Roboto Slab"/>
+              </a:rPr>
+              <a:t>50 GB; File Size Limit:</a:t>
+            </a:r>
+            <a:r>
+              <a:rPr lang="en-GB" b="0" i="0" dirty="0">
+                <a:solidFill>
+                  <a:srgbClr val="1E1E1E"/>
+                </a:solidFill>
+                <a:effectLst/>
+                <a:latin typeface="Roboto Slab"/>
+              </a:rPr>
+              <a:t> 5GB/file upload limit for native OSF Storage</a:t>
+            </a:r>
+            <a:endParaRPr lang="en-GB" b="1" i="0" dirty="0">
+              <a:solidFill>
+                <a:srgbClr val="FFFFFF"/>
+              </a:solidFill>
+              <a:effectLst/>
+              <a:latin typeface="Open Sans" panose="020B0606030504020204" pitchFamily="34" charset="0"/>
+            </a:endParaRPr>
+          </a:p>
+          <a:p>
+            <a:pPr marL="0" marR="0" lvl="0" indent="0" algn="l" defTabSz="914400" rtl="0" eaLnBrk="1" fontAlgn="auto" latinLnBrk="0" hangingPunct="1">
+              <a:lnSpc>
+                <a:spcPct val="100000"/>
+              </a:lnSpc>
+              <a:spcBef>
+                <a:spcPts val="0"/>
+              </a:spcBef>
+              <a:spcAft>
+                <a:spcPts val="0"/>
+              </a:spcAft>
+              <a:buClrTx/>
+              <a:buSzTx/>
+              <a:buFontTx/>
+              <a:buNone/>
+              <a:tabLst/>
+              <a:defRPr/>
+            </a:pPr>
+            <a:endParaRPr lang="en-GB" b="1" i="0" dirty="0">
+              <a:solidFill>
+                <a:srgbClr val="1E1E1E"/>
+              </a:solidFill>
+              <a:effectLst/>
+              <a:latin typeface="Roboto Slab"/>
+            </a:endParaRPr>
+          </a:p>
+          <a:p>
+            <a:r>
+              <a:rPr lang="en-GB" dirty="0"/>
+              <a:t>Dryad, Figshare and </a:t>
+            </a:r>
             <a:r>
               <a:rPr lang="en-GB" dirty="0" err="1"/>
               <a:t>Dataverse</a:t>
             </a:r>
             <a:r>
               <a:rPr lang="en-GB" dirty="0"/>
-              <a:t> is funded by Harvard with additional support from the Alfred P. Sloan Foundation, National Science Foundation, National Institutes of Health, Helmsley Charitable Trust, IQSS's Henry A. Murray Research Archive, and many others. </a:t>
-            </a:r>
+              <a:t> work with institutions and funders to have independent installations and the affiliated institutions will often have more features and will allow higher storage caps. </a:t>
+            </a:r>
+          </a:p>
+          <a:p>
+            <a:endParaRPr lang="en-GB" dirty="0"/>
+          </a:p>
+          <a:p>
+            <a:endParaRPr lang="en-GB" dirty="0"/>
           </a:p>
         </p:txBody>
       </p:sp>
@@ -1061,7 +1313,7 @@
           <a:p>
             <a:fld id="{5913FB77-D8DB-4AB9-8EA5-EE8C3B57A5E1}" type="datetimeFigureOut">
               <a:rPr lang="en-GB" smtClean="0"/>
-              <a:t>01/03/2024</a:t>
+              <a:t>21/03/2024</a:t>
             </a:fld>
             <a:endParaRPr lang="en-GB"/>
           </a:p>
@@ -1308,7 +1560,7 @@
           <a:p>
             <a:fld id="{5913FB77-D8DB-4AB9-8EA5-EE8C3B57A5E1}" type="datetimeFigureOut">
               <a:rPr lang="en-GB" smtClean="0"/>
-              <a:t>01/03/2024</a:t>
+              <a:t>21/03/2024</a:t>
             </a:fld>
             <a:endParaRPr lang="en-GB"/>
           </a:p>
@@ -1518,7 +1770,7 @@
           <a:p>
             <a:fld id="{5913FB77-D8DB-4AB9-8EA5-EE8C3B57A5E1}" type="datetimeFigureOut">
               <a:rPr lang="en-GB" smtClean="0"/>
-              <a:t>01/03/2024</a:t>
+              <a:t>21/03/2024</a:t>
             </a:fld>
             <a:endParaRPr lang="en-GB"/>
           </a:p>
@@ -1718,7 +1970,7 @@
           <a:p>
             <a:fld id="{5913FB77-D8DB-4AB9-8EA5-EE8C3B57A5E1}" type="datetimeFigureOut">
               <a:rPr lang="en-GB" smtClean="0"/>
-              <a:t>01/03/2024</a:t>
+              <a:t>21/03/2024</a:t>
             </a:fld>
             <a:endParaRPr lang="en-GB"/>
           </a:p>
@@ -1994,7 +2246,7 @@
           <a:p>
             <a:fld id="{5913FB77-D8DB-4AB9-8EA5-EE8C3B57A5E1}" type="datetimeFigureOut">
               <a:rPr lang="en-GB" smtClean="0"/>
-              <a:t>01/03/2024</a:t>
+              <a:t>21/03/2024</a:t>
             </a:fld>
             <a:endParaRPr lang="en-GB"/>
           </a:p>
@@ -2262,7 +2514,7 @@
           <a:p>
             <a:fld id="{5913FB77-D8DB-4AB9-8EA5-EE8C3B57A5E1}" type="datetimeFigureOut">
               <a:rPr lang="en-GB" smtClean="0"/>
-              <a:t>01/03/2024</a:t>
+              <a:t>21/03/2024</a:t>
             </a:fld>
             <a:endParaRPr lang="en-GB"/>
           </a:p>
@@ -2677,7 +2929,7 @@
           <a:p>
             <a:fld id="{5913FB77-D8DB-4AB9-8EA5-EE8C3B57A5E1}" type="datetimeFigureOut">
               <a:rPr lang="en-GB" smtClean="0"/>
-              <a:t>01/03/2024</a:t>
+              <a:t>21/03/2024</a:t>
             </a:fld>
             <a:endParaRPr lang="en-GB"/>
           </a:p>
@@ -2819,7 +3071,7 @@
           <a:p>
             <a:fld id="{5913FB77-D8DB-4AB9-8EA5-EE8C3B57A5E1}" type="datetimeFigureOut">
               <a:rPr lang="en-GB" smtClean="0"/>
-              <a:t>01/03/2024</a:t>
+              <a:t>21/03/2024</a:t>
             </a:fld>
             <a:endParaRPr lang="en-GB"/>
           </a:p>
@@ -2932,7 +3184,7 @@
           <a:p>
             <a:fld id="{5913FB77-D8DB-4AB9-8EA5-EE8C3B57A5E1}" type="datetimeFigureOut">
               <a:rPr lang="en-GB" smtClean="0"/>
-              <a:t>01/03/2024</a:t>
+              <a:t>21/03/2024</a:t>
             </a:fld>
             <a:endParaRPr lang="en-GB"/>
           </a:p>
@@ -3245,7 +3497,7 @@
           <a:p>
             <a:fld id="{5913FB77-D8DB-4AB9-8EA5-EE8C3B57A5E1}" type="datetimeFigureOut">
               <a:rPr lang="en-GB" smtClean="0"/>
-              <a:t>01/03/2024</a:t>
+              <a:t>21/03/2024</a:t>
             </a:fld>
             <a:endParaRPr lang="en-GB"/>
           </a:p>
@@ -3534,7 +3786,7 @@
           <a:p>
             <a:fld id="{5913FB77-D8DB-4AB9-8EA5-EE8C3B57A5E1}" type="datetimeFigureOut">
               <a:rPr lang="en-GB" smtClean="0"/>
-              <a:t>01/03/2024</a:t>
+              <a:t>21/03/2024</a:t>
             </a:fld>
             <a:endParaRPr lang="en-GB"/>
           </a:p>
@@ -3776,7 +4028,7 @@
             <a:fld id="{5913FB77-D8DB-4AB9-8EA5-EE8C3B57A5E1}" type="datetimeFigureOut">
               <a:rPr lang="en-GB" smtClean="0"/>
               <a:pPr/>
-              <a:t>01/03/2024</a:t>
+              <a:t>21/03/2024</a:t>
             </a:fld>
             <a:endParaRPr lang="en-GB"/>
           </a:p>
@@ -4360,7 +4612,7 @@
         <p:spPr>
           <a:xfrm>
             <a:off x="742384" y="2064189"/>
-            <a:ext cx="10981854" cy="2677656"/>
+            <a:ext cx="10981854" cy="3139321"/>
           </a:xfrm>
           <a:prstGeom prst="rect">
             <a:avLst/>
@@ -4373,6 +4625,9 @@
           <a:lstStyle/>
           <a:p>
             <a:pPr marL="285750" indent="-285750">
+              <a:spcBef>
+                <a:spcPts val="600"/>
+              </a:spcBef>
               <a:buFont typeface="Arial" panose="020B0604020202020204" pitchFamily="34" charset="0"/>
               <a:buChar char="•"/>
             </a:pPr>
@@ -4392,6 +4647,9 @@
           </a:p>
           <a:p>
             <a:pPr marL="285750" indent="-285750">
+              <a:spcBef>
+                <a:spcPts val="600"/>
+              </a:spcBef>
               <a:buFont typeface="Arial" panose="020B0604020202020204" pitchFamily="34" charset="0"/>
               <a:buChar char="•"/>
             </a:pPr>
@@ -4401,11 +4659,62 @@
                   <a:srgbClr val="0070C0"/>
                 </a:solidFill>
               </a:rPr>
-              <a:t>Data specific features (e.g. Visulization)</a:t>
+              <a:t>Data specific features (e.g.</a:t>
+            </a:r>
+            <a:r>
+              <a:rPr lang="en-GB" sz="2400" dirty="0">
+                <a:solidFill>
+                  <a:srgbClr val="0070C0"/>
+                </a:solidFill>
+              </a:rPr>
+              <a:t>,</a:t>
+            </a:r>
+            <a:r>
+              <a:rPr lang="pl-PL" sz="2400" dirty="0">
+                <a:solidFill>
+                  <a:srgbClr val="0070C0"/>
+                </a:solidFill>
+              </a:rPr>
+              <a:t> </a:t>
+            </a:r>
+            <a:r>
+              <a:rPr lang="en-GB" sz="2400" dirty="0">
+                <a:solidFill>
+                  <a:srgbClr val="0070C0"/>
+                </a:solidFill>
+              </a:rPr>
+              <a:t>v</a:t>
+            </a:r>
+            <a:r>
+              <a:rPr lang="pl-PL" sz="2400" dirty="0">
+                <a:solidFill>
+                  <a:srgbClr val="0070C0"/>
+                </a:solidFill>
+              </a:rPr>
+              <a:t>isu</a:t>
+            </a:r>
+            <a:r>
+              <a:rPr lang="en-GB" sz="2400" dirty="0">
+                <a:solidFill>
+                  <a:srgbClr val="0070C0"/>
+                </a:solidFill>
+              </a:rPr>
+              <a:t>a</a:t>
+            </a:r>
+            <a:r>
+              <a:rPr lang="pl-PL" sz="2400" dirty="0">
+                <a:solidFill>
+                  <a:srgbClr val="0070C0"/>
+                </a:solidFill>
+              </a:rPr>
+              <a:t>lization)</a:t>
             </a:r>
           </a:p>
           <a:p>
             <a:pPr marL="285750" indent="-285750">
+              <a:spcBef>
+                <a:spcPts val="600"/>
+              </a:spcBef>
               <a:buFont typeface="Arial" panose="020B0604020202020204" pitchFamily="34" charset="0"/>
               <a:buChar char="•"/>
             </a:pPr>
@@ -4420,6 +4729,9 @@
           </a:p>
           <a:p>
             <a:pPr marL="285750" indent="-285750">
+              <a:spcBef>
+                <a:spcPts val="600"/>
+              </a:spcBef>
               <a:buFont typeface="Arial" panose="020B0604020202020204" pitchFamily="34" charset="0"/>
               <a:buChar char="•"/>
             </a:pPr>
@@ -4429,11 +4741,46 @@
                   <a:srgbClr val="0070C0"/>
                 </a:solidFill>
               </a:rPr>
-              <a:t>API for data retrival / agregation /searching</a:t>
+              <a:t>API for data retri</a:t>
+            </a:r>
+            <a:r>
+              <a:rPr lang="en-GB" sz="2400" dirty="0">
+                <a:solidFill>
+                  <a:srgbClr val="0070C0"/>
+                </a:solidFill>
+              </a:rPr>
+              <a:t>e</a:t>
+            </a:r>
+            <a:r>
+              <a:rPr lang="pl-PL" sz="2400" dirty="0">
+                <a:solidFill>
+                  <a:srgbClr val="0070C0"/>
+                </a:solidFill>
+              </a:rPr>
+              <a:t>val / ag</a:t>
+            </a:r>
+            <a:r>
+              <a:rPr lang="en-GB" sz="2400" dirty="0">
+                <a:solidFill>
+                  <a:srgbClr val="0070C0"/>
+                </a:solidFill>
+              </a:rPr>
+              <a:t>g</a:t>
+            </a:r>
+            <a:r>
+              <a:rPr lang="pl-PL" sz="2400" dirty="0">
+                <a:solidFill>
+                  <a:srgbClr val="0070C0"/>
+                </a:solidFill>
+              </a:rPr>
+              <a:t>regation /searching</a:t>
             </a:r>
           </a:p>
           <a:p>
             <a:pPr marL="285750" indent="-285750">
+              <a:spcBef>
+                <a:spcPts val="600"/>
+              </a:spcBef>
               <a:buFont typeface="Arial" panose="020B0604020202020204" pitchFamily="34" charset="0"/>
               <a:buChar char="•"/>
             </a:pPr>
@@ -4448,6 +4795,9 @@
           </a:p>
           <a:p>
             <a:pPr marL="285750" indent="-285750">
+              <a:spcBef>
+                <a:spcPts val="600"/>
+              </a:spcBef>
               <a:buFont typeface="Arial" panose="020B0604020202020204" pitchFamily="34" charset="0"/>
               <a:buChar char="•"/>
             </a:pPr>
@@ -4462,6 +4812,9 @@
           </a:p>
           <a:p>
             <a:pPr marL="285750" indent="-285750">
+              <a:spcBef>
+                <a:spcPts val="600"/>
+              </a:spcBef>
               <a:buFont typeface="Arial" panose="020B0604020202020204" pitchFamily="34" charset="0"/>
               <a:buChar char="•"/>
             </a:pPr>
@@ -4809,7 +5162,7 @@
         </p:nvSpPr>
         <p:spPr>
           <a:xfrm>
-            <a:off x="1168958" y="2209850"/>
+            <a:off x="704263" y="2209850"/>
             <a:ext cx="10158884" cy="2805063"/>
           </a:xfrm>
           <a:prstGeom prst="rect">
@@ -4860,7 +5213,7 @@
                 <a:effectLst/>
                 <a:latin typeface="Ubuntu"/>
               </a:rPr>
-              <a:t>The repository is more relevant to your discipline than a generalist one.</a:t>
+              <a:t> The repository is more relevant to your discipline than a generalist one.</a:t>
             </a:r>
           </a:p>
           <a:p>
@@ -4879,7 +5232,7 @@
                 <a:effectLst/>
                 <a:latin typeface="Ubuntu"/>
               </a:rPr>
-              <a:t>Higher exposure (people looking for those specific types of data will usually first look at the specific repository).</a:t>
+              <a:t> Higher exposure (people looking for those specific types of data will usually first look at the specific repository).</a:t>
             </a:r>
           </a:p>
           <a:p>
@@ -4898,7 +5251,7 @@
                 <a:effectLst/>
                 <a:latin typeface="Ubuntu"/>
               </a:rPr>
-              <a:t>Higher number of citations (see above).</a:t>
+              <a:t> Higher number of citations (see above).</a:t>
             </a:r>
           </a:p>
         </p:txBody>
@@ -6639,15 +6992,7 @@
           <a:p>
             <a:r>
               <a:rPr lang="en-GB" dirty="0"/>
-              <a:t>What about </a:t>
-            </a:r>
-            <a:r>
-              <a:rPr lang="en-GB" dirty="0" err="1"/>
-              <a:t>Github</a:t>
-            </a:r>
-            <a:r>
-              <a:rPr lang="en-GB" dirty="0"/>
-              <a:t>? </a:t>
+              <a:t>What about GitHub? </a:t>
             </a:r>
           </a:p>
         </p:txBody>
@@ -6666,8 +7011,8 @@
         </p:nvSpPr>
         <p:spPr>
           <a:xfrm>
-            <a:off x="3763133" y="1231312"/>
-            <a:ext cx="6332137" cy="2308324"/>
+            <a:off x="3561302" y="1372820"/>
+            <a:ext cx="6332137" cy="2123658"/>
           </a:xfrm>
           <a:prstGeom prst="rect">
             <a:avLst/>
@@ -6687,7 +7032,7 @@
           <a:p>
             <a:pPr algn="just"/>
             <a:r>
-              <a:rPr lang="en-GB" sz="2400" b="0" i="0" dirty="0">
+              <a:rPr lang="en-GB" sz="2200" b="0" i="0" dirty="0">
                 <a:solidFill>
                   <a:srgbClr val="333333"/>
                 </a:solidFill>
@@ -6697,7 +7042,7 @@
               <a:t>To make </a:t>
             </a:r>
             <a:r>
-              <a:rPr lang="pl-PL" sz="2400" b="0" i="0" dirty="0">
+              <a:rPr lang="pl-PL" sz="2200" b="0" i="0" dirty="0">
                 <a:solidFill>
                   <a:srgbClr val="333333"/>
                 </a:solidFill>
@@ -6707,7 +7052,7 @@
               <a:t>the exact version of </a:t>
             </a:r>
             <a:r>
-              <a:rPr lang="en-GB" sz="2400" b="0" i="0" dirty="0">
+              <a:rPr lang="en-GB" sz="2200" b="0" i="0" dirty="0">
                 <a:solidFill>
                   <a:srgbClr val="333333"/>
                 </a:solidFill>
@@ -6717,7 +7062,7 @@
               <a:t>your code reference</a:t>
             </a:r>
             <a:r>
-              <a:rPr lang="pl-PL" sz="2400" b="0" i="0" dirty="0">
+              <a:rPr lang="pl-PL" sz="2200" b="0" i="0" dirty="0">
                 <a:solidFill>
                   <a:srgbClr val="333333"/>
                 </a:solidFill>
@@ -6727,7 +7072,7 @@
               <a:t>d</a:t>
             </a:r>
             <a:r>
-              <a:rPr lang="en-GB" sz="2400" b="0" i="0" dirty="0">
+              <a:rPr lang="en-GB" sz="2200" b="0" i="0" dirty="0">
                 <a:solidFill>
                   <a:srgbClr val="333333"/>
                 </a:solidFill>
@@ -6737,7 +7082,7 @@
               <a:t> in </a:t>
             </a:r>
             <a:r>
-              <a:rPr lang="pl-PL" sz="2400" b="0" i="0" dirty="0">
+              <a:rPr lang="pl-PL" sz="2200" b="0" i="0" dirty="0">
                 <a:solidFill>
                   <a:srgbClr val="333333"/>
                 </a:solidFill>
@@ -6747,7 +7092,7 @@
               <a:t>a publication</a:t>
             </a:r>
             <a:r>
-              <a:rPr lang="en-GB" sz="2400" b="0" i="0" dirty="0">
+              <a:rPr lang="en-GB" sz="2200" b="0" i="0" dirty="0">
                 <a:solidFill>
                   <a:srgbClr val="333333"/>
                 </a:solidFill>
@@ -6757,26 +7102,46 @@
               <a:t>, you can create </a:t>
             </a:r>
             <a:r>
-              <a:rPr lang="pl-PL" sz="2400" b="0" i="0" dirty="0">
+              <a:rPr lang="pl-PL" sz="2200" b="0" i="0" dirty="0">
                 <a:solidFill>
                   <a:srgbClr val="333333"/>
                 </a:solidFill>
                 <a:effectLst/>
                 <a:latin typeface="Ubuntu"/>
               </a:rPr>
-              <a:t>snapshot of the repository and obtain a doi for it</a:t>
-            </a:r>
-            <a:r>
-              <a:rPr lang="en-GB" sz="2400" b="0" i="0" dirty="0">
+              <a:t>snapshot of the repository and obtain a </a:t>
+            </a:r>
+            <a:r>
+              <a:rPr lang="en-GB" sz="2200" b="0" i="0" dirty="0">
                 <a:solidFill>
                   <a:srgbClr val="333333"/>
                 </a:solidFill>
                 <a:effectLst/>
                 <a:latin typeface="Ubuntu"/>
               </a:rPr>
+              <a:t>DOI</a:t>
+            </a:r>
+            <a:r>
+              <a:rPr lang="pl-PL" sz="2200" b="0" i="0" dirty="0">
+                <a:solidFill>
+                  <a:srgbClr val="333333"/>
+                </a:solidFill>
+                <a:effectLst/>
+                <a:latin typeface="Ubuntu"/>
+              </a:rPr>
+              <a:t> for it</a:t>
+            </a:r>
+            <a:r>
+              <a:rPr lang="en-GB" sz="2200" b="0" i="0" dirty="0">
+                <a:solidFill>
+                  <a:srgbClr val="333333"/>
+                </a:solidFill>
+                <a:effectLst/>
+                <a:latin typeface="Ubuntu"/>
+              </a:rPr>
               <a:t>. </a:t>
             </a:r>
-            <a:endParaRPr lang="pl-PL" sz="2400" b="0" i="0" dirty="0">
+            <a:endParaRPr lang="pl-PL" sz="2200" b="0" i="0" dirty="0">
               <a:solidFill>
                 <a:srgbClr val="333333"/>
               </a:solidFill>
@@ -6787,7 +7152,7 @@
           <a:p>
             <a:pPr algn="just"/>
             <a:br>
-              <a:rPr lang="pl-PL" sz="2400" b="0" i="0" dirty="0">
+              <a:rPr lang="pl-PL" sz="2200" b="0" i="0" dirty="0">
                 <a:solidFill>
                   <a:srgbClr val="333333"/>
                 </a:solidFill>
@@ -6796,7 +7161,7 @@
               </a:rPr>
             </a:br>
             <a:r>
-              <a:rPr lang="pl-PL" sz="2400" b="0" i="0" dirty="0">
+              <a:rPr lang="pl-PL" sz="2200" b="0" i="0" dirty="0">
                 <a:solidFill>
                   <a:srgbClr val="333333"/>
                 </a:solidFill>
@@ -6806,36 +7171,16 @@
               <a:t>For example</a:t>
             </a:r>
             <a:r>
-              <a:rPr lang="en-GB" sz="2400" b="0" i="0" dirty="0">
+              <a:rPr lang="en-GB" sz="2200" b="0" i="0" dirty="0">
                 <a:solidFill>
                   <a:srgbClr val="333333"/>
                 </a:solidFill>
                 <a:effectLst/>
                 <a:latin typeface="Ubuntu"/>
               </a:rPr>
-              <a:t>, you can use the data archiving tool in </a:t>
-            </a:r>
-            <a:r>
-              <a:rPr lang="en-GB" sz="2400" b="0" i="0" dirty="0" err="1">
-                <a:solidFill>
-                  <a:srgbClr val="333333"/>
-                </a:solidFill>
-                <a:effectLst/>
-                <a:latin typeface="Ubuntu"/>
-              </a:rPr>
-              <a:t>Zenodo</a:t>
-            </a:r>
-            <a:r>
-              <a:rPr lang="en-GB" sz="2400" b="0" i="0" dirty="0">
-                <a:solidFill>
-                  <a:srgbClr val="333333"/>
-                </a:solidFill>
-                <a:effectLst/>
-                <a:latin typeface="Ubuntu"/>
-              </a:rPr>
-              <a:t> to archive a GitHub repository.</a:t>
-            </a:r>
-            <a:endParaRPr lang="en-GB" sz="2400" dirty="0"/>
+              <a:t>, you can use the data archiving tool in Zenodo (or Figshare) to archive a GitHub repository.</a:t>
+            </a:r>
+            <a:endParaRPr lang="en-GB" sz="2200" dirty="0"/>
           </a:p>
         </p:txBody>
       </p:sp>
@@ -7651,47 +7996,7 @@
                 <a:effectLst/>
                 <a:latin typeface="Ubuntu"/>
               </a:rPr>
-              <a:t>Always include a ReadMe file when you deposit in “General” research data public repositories, such as </a:t>
-            </a:r>
-            <a:r>
-              <a:rPr lang="en-GB" sz="2400" b="0" i="0" dirty="0" err="1">
-                <a:solidFill>
-                  <a:srgbClr val="333333"/>
-                </a:solidFill>
-                <a:effectLst/>
-                <a:latin typeface="Ubuntu"/>
-              </a:rPr>
-              <a:t>DataShare</a:t>
-            </a:r>
-            <a:r>
-              <a:rPr lang="en-GB" sz="2400" b="0" i="0" dirty="0">
-                <a:solidFill>
-                  <a:srgbClr val="333333"/>
-                </a:solidFill>
-                <a:effectLst/>
-                <a:latin typeface="Ubuntu"/>
-              </a:rPr>
-              <a:t> or </a:t>
-            </a:r>
-            <a:r>
-              <a:rPr lang="en-GB" sz="2400" b="0" i="0" dirty="0" err="1">
-                <a:solidFill>
-                  <a:srgbClr val="333333"/>
-                </a:solidFill>
-                <a:effectLst/>
-                <a:latin typeface="Ubuntu"/>
-              </a:rPr>
-              <a:t>Zenodo</a:t>
-            </a:r>
-            <a:r>
-              <a:rPr lang="en-GB" sz="2400" b="0" i="0" dirty="0">
-                <a:solidFill>
-                  <a:srgbClr val="333333"/>
-                </a:solidFill>
-                <a:effectLst/>
-                <a:latin typeface="Ubuntu"/>
-              </a:rPr>
-              <a:t>.</a:t>
+              <a:t>Always include a ReadMe file when you deposit in “General” research data public repositories, such as Zenodo.</a:t>
             </a:r>
             <a:endParaRPr lang="en-GB" sz="2400" dirty="0"/>
           </a:p>
@@ -7711,7 +8016,7 @@
         </p:nvSpPr>
         <p:spPr>
           <a:xfrm>
-            <a:off x="7352472" y="4571050"/>
+            <a:off x="7307501" y="4444831"/>
             <a:ext cx="6094324" cy="369332"/>
           </a:xfrm>
           <a:prstGeom prst="rect">
@@ -7780,13 +8085,8 @@
             </a:r>
             <a:r>
               <a:rPr lang="en-GB" dirty="0"/>
-              <a:t> Wiki Page for </a:t>
-            </a:r>
-            <a:r>
-              <a:rPr lang="en-GB" dirty="0" err="1"/>
-              <a:t>DataShare</a:t>
-            </a:r>
-            <a:endParaRPr lang="en-GB" dirty="0"/>
+              <a:t> Wiki Page</a:t>
+            </a:r>
           </a:p>
         </p:txBody>
       </p:sp>
@@ -8884,8 +9184,8 @@
         </p:nvSpPr>
         <p:spPr>
           <a:xfrm>
-            <a:off x="624689" y="1774196"/>
-            <a:ext cx="10601608" cy="3046988"/>
+            <a:off x="736277" y="1574824"/>
+            <a:ext cx="10601608" cy="3682226"/>
           </a:xfrm>
           <a:prstGeom prst="rect">
             <a:avLst/>
@@ -8910,7 +9210,7 @@
                   <a:srgbClr val="0070C0"/>
                 </a:solidFill>
               </a:rPr>
-              <a:t>[Dryad](</a:t>
+              <a:t>Dryad (</a:t>
             </a:r>
             <a:r>
               <a:rPr lang="en-GB" sz="2400" dirty="0">
@@ -8949,23 +9249,7 @@
                   <a:srgbClr val="0070C0"/>
                 </a:solidFill>
               </a:rPr>
-              <a:t>[</a:t>
-            </a:r>
-            <a:r>
-              <a:rPr lang="en-GB" sz="2400" dirty="0" err="1">
-                <a:solidFill>
-                  <a:srgbClr val="0070C0"/>
-                </a:solidFill>
-              </a:rPr>
-              <a:t>Zenodo</a:t>
-            </a:r>
-            <a:r>
-              <a:rPr lang="en-GB" sz="2400" dirty="0">
-                <a:solidFill>
-                  <a:srgbClr val="0070C0"/>
-                </a:solidFill>
-              </a:rPr>
-              <a:t>](</a:t>
+              <a:t>Zenodo (</a:t>
             </a:r>
             <a:r>
               <a:rPr lang="en-GB" sz="2400" dirty="0">
@@ -8999,28 +9283,20 @@
               <a:buChar char="•"/>
             </a:pPr>
             <a:r>
+              <a:rPr lang="en-GB" sz="2400" dirty="0" err="1">
+                <a:solidFill>
+                  <a:srgbClr val="0070C0"/>
+                </a:solidFill>
+              </a:rPr>
+              <a:t>FigShare</a:t>
+            </a:r>
+            <a:r>
               <a:rPr lang="en-GB" sz="2400" dirty="0">
                 <a:solidFill>
                   <a:srgbClr val="0070C0"/>
                 </a:solidFill>
               </a:rPr>
-              <a:t>[</a:t>
-            </a:r>
-            <a:r>
-              <a:rPr lang="en-GB" sz="2400" dirty="0" err="1">
-                <a:solidFill>
-                  <a:srgbClr val="0070C0"/>
-                </a:solidFill>
-              </a:rPr>
-              <a:t>FigShare</a:t>
-            </a:r>
-            <a:r>
-              <a:rPr lang="en-GB" sz="2400" dirty="0">
-                <a:solidFill>
-                  <a:srgbClr val="0070C0"/>
-                </a:solidFill>
-              </a:rPr>
-              <a:t>](</a:t>
+              <a:t> (</a:t>
             </a:r>
             <a:r>
               <a:rPr lang="en-GB" sz="2400" dirty="0">
@@ -9054,37 +9330,63 @@
               <a:buChar char="•"/>
             </a:pPr>
             <a:r>
+              <a:rPr lang="en-GB" sz="2400" dirty="0" err="1">
+                <a:solidFill>
+                  <a:srgbClr val="0070C0"/>
+                </a:solidFill>
+              </a:rPr>
+              <a:t>Dataverse</a:t>
+            </a:r>
+            <a:r>
               <a:rPr lang="en-GB" sz="2400" dirty="0">
                 <a:solidFill>
                   <a:srgbClr val="0070C0"/>
                 </a:solidFill>
               </a:rPr>
-              <a:t>[</a:t>
-            </a:r>
-            <a:r>
-              <a:rPr lang="en-GB" sz="2400" dirty="0" err="1">
-                <a:solidFill>
-                  <a:srgbClr val="0070C0"/>
-                </a:solidFill>
-              </a:rPr>
-              <a:t>Dataverse</a:t>
+              <a:t> (</a:t>
             </a:r>
             <a:r>
               <a:rPr lang="en-GB" sz="2400" dirty="0">
                 <a:solidFill>
                   <a:srgbClr val="0070C0"/>
                 </a:solidFill>
-              </a:rPr>
-              <a:t>](</a:t>
+                <a:hlinkClick r:id="rId7"/>
+              </a:rPr>
+              <a:t>http://dataverse.org</a:t>
             </a:r>
             <a:r>
               <a:rPr lang="en-GB" sz="2400" dirty="0">
                 <a:solidFill>
                   <a:srgbClr val="0070C0"/>
                 </a:solidFill>
-                <a:hlinkClick r:id="rId7"/>
-              </a:rPr>
-              <a:t>http://dataverse.org</a:t>
+              </a:rPr>
+              <a:t>)</a:t>
+            </a:r>
+          </a:p>
+          <a:p>
+            <a:pPr marL="285750" indent="-285750">
+              <a:lnSpc>
+                <a:spcPct val="200000"/>
+              </a:lnSpc>
+              <a:buFont typeface="Arial" panose="020B0604020202020204" pitchFamily="34" charset="0"/>
+              <a:buChar char="•"/>
+            </a:pPr>
+            <a:r>
+              <a:rPr lang="en-GB" sz="2400" dirty="0">
+                <a:solidFill>
+                  <a:srgbClr val="0070C0"/>
+                </a:solidFill>
+              </a:rPr>
+              <a:t>Open Science Framework (</a:t>
+            </a:r>
+            <a:r>
+              <a:rPr lang="en-GB" sz="2400" dirty="0">
+                <a:solidFill>
+                  <a:srgbClr val="0070C0"/>
+                </a:solidFill>
+                <a:hlinkClick r:id="rId8"/>
+              </a:rPr>
+              <a:t>https://osf.io/</a:t>
             </a:r>
             <a:r>
               <a:rPr lang="en-GB" sz="2400" dirty="0">
@@ -9145,7 +9447,7 @@
           <p:nvPr/>
         </p:nvPicPr>
         <p:blipFill>
-          <a:blip r:embed="rId8" cstate="hqprint">
+          <a:blip r:embed="rId9" cstate="hqprint">
             <a:extLst>
               <a:ext uri="{28A0092B-C50C-407E-A947-70E740481C1C}">
                 <a14:useLocalDpi xmlns:a14="http://schemas.microsoft.com/office/drawing/2010/main" val="0"/>
@@ -9159,7 +9461,7 @@
         </p:blipFill>
         <p:spPr bwMode="auto">
           <a:xfrm>
-            <a:off x="5216889" y="1903853"/>
+            <a:off x="6058162" y="1748969"/>
             <a:ext cx="2186570" cy="363859"/>
           </a:xfrm>
           <a:prstGeom prst="rect">
@@ -9192,7 +9494,7 @@
           <p:nvPr/>
         </p:nvPicPr>
         <p:blipFill>
-          <a:blip r:embed="rId9" cstate="hqprint">
+          <a:blip r:embed="rId10" cstate="hqprint">
             <a:extLst>
               <a:ext uri="{28A0092B-C50C-407E-A947-70E740481C1C}">
                 <a14:useLocalDpi xmlns:a14="http://schemas.microsoft.com/office/drawing/2010/main" val="0"/>
@@ -9206,7 +9508,7 @@
         </p:blipFill>
         <p:spPr bwMode="auto">
           <a:xfrm>
-            <a:off x="4923005" y="2443283"/>
+            <a:off x="6160125" y="2138980"/>
             <a:ext cx="2345990" cy="938396"/>
           </a:xfrm>
           <a:prstGeom prst="rect">
@@ -9239,7 +9541,7 @@
           <p:nvPr/>
         </p:nvPicPr>
         <p:blipFill>
-          <a:blip r:embed="rId10">
+          <a:blip r:embed="rId11">
             <a:extLst>
               <a:ext uri="{28A0092B-C50C-407E-A947-70E740481C1C}">
                 <a14:useLocalDpi xmlns:a14="http://schemas.microsoft.com/office/drawing/2010/main" val="0"/>
@@ -9253,7 +9555,7 @@
         </p:blipFill>
         <p:spPr bwMode="auto">
           <a:xfrm>
-            <a:off x="5387577" y="3282766"/>
+            <a:off x="6237148" y="2925683"/>
             <a:ext cx="2286870" cy="862642"/>
           </a:xfrm>
           <a:prstGeom prst="rect">
@@ -9286,7 +9588,7 @@
           <p:nvPr/>
         </p:nvPicPr>
         <p:blipFill>
-          <a:blip r:embed="rId11">
+          <a:blip r:embed="rId12">
             <a:extLst>
               <a:ext uri="{28A0092B-C50C-407E-A947-70E740481C1C}">
                 <a14:useLocalDpi xmlns:a14="http://schemas.microsoft.com/office/drawing/2010/main" val="0"/>
@@ -9300,7 +9602,7 @@
         </p:blipFill>
         <p:spPr bwMode="auto">
           <a:xfrm>
-            <a:off x="5546498" y="4195974"/>
+            <a:off x="6331102" y="3729094"/>
             <a:ext cx="2456534" cy="938396"/>
           </a:xfrm>
           <a:prstGeom prst="rect">
@@ -9318,6 +9620,295 @@
           </a:extLst>
         </p:spPr>
       </p:pic>
+      <p:pic>
+        <p:nvPicPr>
+          <p:cNvPr id="5" name="Picture 2" descr="OSF">
+            <a:extLst>
+              <a:ext uri="{FF2B5EF4-FFF2-40B4-BE49-F238E27FC236}">
+                <a16:creationId xmlns:a16="http://schemas.microsoft.com/office/drawing/2014/main" id="{DC245F48-95EE-41EC-A2A6-03AFC6E96A02}"/>
+              </a:ext>
+            </a:extLst>
+          </p:cNvPr>
+          <p:cNvPicPr>
+            <a:picLocks noChangeAspect="1" noChangeArrowheads="1"/>
+          </p:cNvPicPr>
+          <p:nvPr/>
+        </p:nvPicPr>
+        <p:blipFill rotWithShape="1">
+          <a:blip r:embed="rId13">
+            <a:extLst>
+              <a:ext uri="{28A0092B-C50C-407E-A947-70E740481C1C}">
+                <a14:useLocalDpi xmlns:a14="http://schemas.microsoft.com/office/drawing/2010/main" val="0"/>
+              </a:ext>
+            </a:extLst>
+          </a:blip>
+          <a:srcRect l="15369" t="30712" r="22848" b="26010"/>
+          <a:stretch/>
+        </p:blipFill>
+        <p:spPr bwMode="auto">
+          <a:xfrm>
+            <a:off x="6464859" y="4770239"/>
+            <a:ext cx="2041256" cy="804316"/>
+          </a:xfrm>
+          <a:prstGeom prst="rect">
+            <a:avLst/>
+          </a:prstGeom>
+          <a:noFill/>
+          <a:extLst>
+            <a:ext uri="{909E8E84-426E-40DD-AFC4-6F175D3DCCD1}">
+              <a14:hiddenFill xmlns:a14="http://schemas.microsoft.com/office/drawing/2010/main">
+                <a:solidFill>
+                  <a:srgbClr val="FFFFFF"/>
+                </a:solidFill>
+              </a14:hiddenFill>
+            </a:ext>
+          </a:extLst>
+        </p:spPr>
+      </p:pic>
+      <p:sp>
+        <p:nvSpPr>
+          <p:cNvPr id="6" name="TextBox 5">
+            <a:extLst>
+              <a:ext uri="{FF2B5EF4-FFF2-40B4-BE49-F238E27FC236}">
+                <a16:creationId xmlns:a16="http://schemas.microsoft.com/office/drawing/2014/main" id="{077D697D-8A22-425E-964E-DDA95C072A41}"/>
+              </a:ext>
+            </a:extLst>
+          </p:cNvPr>
+          <p:cNvSpPr txBox="1"/>
+          <p:nvPr/>
+        </p:nvSpPr>
+        <p:spPr>
+          <a:xfrm>
+            <a:off x="736277" y="6075167"/>
+            <a:ext cx="6802183" cy="369332"/>
+          </a:xfrm>
+          <a:prstGeom prst="rect">
+            <a:avLst/>
+          </a:prstGeom>
+          <a:noFill/>
+        </p:spPr>
+        <p:txBody>
+          <a:bodyPr wrap="none" rtlCol="0">
+            <a:spAutoFit/>
+          </a:bodyPr>
+          <a:lstStyle/>
+          <a:p>
+            <a:r>
+              <a:rPr lang="en-GB" dirty="0">
+                <a:solidFill>
+                  <a:schemeClr val="accent1"/>
+                </a:solidFill>
+              </a:rPr>
+              <a:t>Or your own institutional repository - e.g., University of Edinburgh has </a:t>
+            </a:r>
+          </a:p>
+        </p:txBody>
+      </p:sp>
+      <p:pic>
+        <p:nvPicPr>
+          <p:cNvPr id="7" name="Picture 6">
+            <a:extLst>
+              <a:ext uri="{FF2B5EF4-FFF2-40B4-BE49-F238E27FC236}">
+                <a16:creationId xmlns:a16="http://schemas.microsoft.com/office/drawing/2014/main" id="{AD37FBA7-B976-4C04-B8D2-35B1F2916957}"/>
+              </a:ext>
+            </a:extLst>
+          </p:cNvPr>
+          <p:cNvPicPr>
+            <a:picLocks noChangeAspect="1"/>
+          </p:cNvPicPr>
+          <p:nvPr/>
+        </p:nvPicPr>
+        <p:blipFill>
+          <a:blip r:embed="rId14"/>
+          <a:stretch>
+            <a:fillRect/>
+          </a:stretch>
+        </p:blipFill>
+        <p:spPr>
+          <a:xfrm>
+            <a:off x="7485487" y="5933980"/>
+            <a:ext cx="1289214" cy="558065"/>
+          </a:xfrm>
+          <a:prstGeom prst="rect">
+            <a:avLst/>
+          </a:prstGeom>
+        </p:spPr>
+      </p:pic>
+      <p:sp>
+        <p:nvSpPr>
+          <p:cNvPr id="8" name="TextBox 7">
+            <a:extLst>
+              <a:ext uri="{FF2B5EF4-FFF2-40B4-BE49-F238E27FC236}">
+                <a16:creationId xmlns:a16="http://schemas.microsoft.com/office/drawing/2014/main" id="{5790CD04-A026-4CEA-8988-87B25CD19CAA}"/>
+              </a:ext>
+            </a:extLst>
+          </p:cNvPr>
+          <p:cNvSpPr txBox="1"/>
+          <p:nvPr/>
+        </p:nvSpPr>
+        <p:spPr>
+          <a:xfrm>
+            <a:off x="8515930" y="1746232"/>
+            <a:ext cx="1918987" cy="369332"/>
+          </a:xfrm>
+          <a:prstGeom prst="rect">
+            <a:avLst/>
+          </a:prstGeom>
+          <a:noFill/>
+        </p:spPr>
+        <p:txBody>
+          <a:bodyPr wrap="none" rtlCol="0">
+            <a:spAutoFit/>
+          </a:bodyPr>
+          <a:lstStyle/>
+          <a:p>
+            <a:r>
+              <a:rPr lang="en-GB" dirty="0"/>
+              <a:t>$ (but can be free)</a:t>
+            </a:r>
+          </a:p>
+        </p:txBody>
+      </p:sp>
+      <p:sp>
+        <p:nvSpPr>
+          <p:cNvPr id="13" name="TextBox 12">
+            <a:extLst>
+              <a:ext uri="{FF2B5EF4-FFF2-40B4-BE49-F238E27FC236}">
+                <a16:creationId xmlns:a16="http://schemas.microsoft.com/office/drawing/2014/main" id="{9BB48D65-2D0E-406C-9251-4A6A52BD8C06}"/>
+              </a:ext>
+            </a:extLst>
+          </p:cNvPr>
+          <p:cNvSpPr txBox="1"/>
+          <p:nvPr/>
+        </p:nvSpPr>
+        <p:spPr>
+          <a:xfrm>
+            <a:off x="8774701" y="3180318"/>
+            <a:ext cx="1175515" cy="369332"/>
+          </a:xfrm>
+          <a:prstGeom prst="rect">
+            <a:avLst/>
+          </a:prstGeom>
+          <a:noFill/>
+        </p:spPr>
+        <p:txBody>
+          <a:bodyPr wrap="none" rtlCol="0">
+            <a:spAutoFit/>
+          </a:bodyPr>
+          <a:lstStyle/>
+          <a:p>
+            <a:r>
+              <a:rPr lang="en-GB" dirty="0"/>
+              <a:t>Free and $</a:t>
+            </a:r>
+          </a:p>
+        </p:txBody>
+      </p:sp>
+      <p:sp>
+        <p:nvSpPr>
+          <p:cNvPr id="15" name="TextBox 14">
+            <a:extLst>
+              <a:ext uri="{FF2B5EF4-FFF2-40B4-BE49-F238E27FC236}">
+                <a16:creationId xmlns:a16="http://schemas.microsoft.com/office/drawing/2014/main" id="{671D8711-15F2-4453-8620-597C0B8DB6F8}"/>
+              </a:ext>
+            </a:extLst>
+          </p:cNvPr>
+          <p:cNvSpPr txBox="1"/>
+          <p:nvPr/>
+        </p:nvSpPr>
+        <p:spPr>
+          <a:xfrm>
+            <a:off x="8623858" y="2428535"/>
+            <a:ext cx="909886" cy="369332"/>
+          </a:xfrm>
+          <a:prstGeom prst="rect">
+            <a:avLst/>
+          </a:prstGeom>
+          <a:noFill/>
+        </p:spPr>
+        <p:txBody>
+          <a:bodyPr wrap="square">
+            <a:spAutoFit/>
+          </a:bodyPr>
+          <a:lstStyle/>
+          <a:p>
+            <a:r>
+              <a:rPr lang="en-GB" dirty="0"/>
+              <a:t>Free</a:t>
+            </a:r>
+          </a:p>
+        </p:txBody>
+      </p:sp>
+      <p:sp>
+        <p:nvSpPr>
+          <p:cNvPr id="16" name="TextBox 15">
+            <a:extLst>
+              <a:ext uri="{FF2B5EF4-FFF2-40B4-BE49-F238E27FC236}">
+                <a16:creationId xmlns:a16="http://schemas.microsoft.com/office/drawing/2014/main" id="{F45CD299-C331-4F20-8CB4-0374AA622D39}"/>
+              </a:ext>
+            </a:extLst>
+          </p:cNvPr>
+          <p:cNvSpPr txBox="1"/>
+          <p:nvPr/>
+        </p:nvSpPr>
+        <p:spPr>
+          <a:xfrm>
+            <a:off x="8817616" y="4013626"/>
+            <a:ext cx="909886" cy="369332"/>
+          </a:xfrm>
+          <a:prstGeom prst="rect">
+            <a:avLst/>
+          </a:prstGeom>
+          <a:noFill/>
+        </p:spPr>
+        <p:txBody>
+          <a:bodyPr wrap="square">
+            <a:spAutoFit/>
+          </a:bodyPr>
+          <a:lstStyle/>
+          <a:p>
+            <a:r>
+              <a:rPr lang="en-GB" dirty="0"/>
+              <a:t>Free</a:t>
+            </a:r>
+          </a:p>
+        </p:txBody>
+      </p:sp>
+      <p:sp>
+        <p:nvSpPr>
+          <p:cNvPr id="17" name="TextBox 16">
+            <a:extLst>
+              <a:ext uri="{FF2B5EF4-FFF2-40B4-BE49-F238E27FC236}">
+                <a16:creationId xmlns:a16="http://schemas.microsoft.com/office/drawing/2014/main" id="{58414539-425D-4B9D-B5E9-0E010EDF2657}"/>
+              </a:ext>
+            </a:extLst>
+          </p:cNvPr>
+          <p:cNvSpPr txBox="1"/>
+          <p:nvPr/>
+        </p:nvSpPr>
+        <p:spPr>
+          <a:xfrm>
+            <a:off x="8817616" y="4977440"/>
+            <a:ext cx="909886" cy="369332"/>
+          </a:xfrm>
+          <a:prstGeom prst="rect">
+            <a:avLst/>
+          </a:prstGeom>
+          <a:noFill/>
+        </p:spPr>
+        <p:txBody>
+          <a:bodyPr wrap="square">
+            <a:spAutoFit/>
+          </a:bodyPr>
+          <a:lstStyle/>
+          <a:p>
+            <a:r>
+              <a:rPr lang="en-GB" dirty="0"/>
+              <a:t>Free</a:t>
+            </a:r>
+          </a:p>
+        </p:txBody>
+      </p:sp>
     </p:spTree>
     <p:extLst>
       <p:ext uri="{BB962C8B-B14F-4D97-AF65-F5344CB8AC3E}">

</xml_diff>

<commit_message>
added protocolsio in repos
</commit_message>
<xml_diff>
--- a/instructors/06-Repositories_v3.1.pptx
+++ b/instructors/06-Repositories_v3.1.pptx
@@ -9941,10 +9941,10 @@
       </p:grpSpPr>
       <p:pic>
         <p:nvPicPr>
-          <p:cNvPr id="2054" name="Picture 6">
-            <a:extLst>
-              <a:ext uri="{FF2B5EF4-FFF2-40B4-BE49-F238E27FC236}">
-                <a16:creationId xmlns:a16="http://schemas.microsoft.com/office/drawing/2014/main" id="{FD98CFB6-B4AA-AC41-8774-90BD2B95063A}"/>
+          <p:cNvPr id="1026" name="Picture 2" descr="Protocols.io">
+            <a:extLst>
+              <a:ext uri="{FF2B5EF4-FFF2-40B4-BE49-F238E27FC236}">
+                <a16:creationId xmlns:a16="http://schemas.microsoft.com/office/drawing/2014/main" id="{3B1DE40E-2E4E-4176-9AA4-563A9AC424C5}"/>
               </a:ext>
             </a:extLst>
           </p:cNvPr>
@@ -9955,6 +9955,53 @@
         </p:nvPicPr>
         <p:blipFill>
           <a:blip r:embed="rId2">
+            <a:extLst>
+              <a:ext uri="{28A0092B-C50C-407E-A947-70E740481C1C}">
+                <a14:useLocalDpi xmlns:a14="http://schemas.microsoft.com/office/drawing/2010/main" val="0"/>
+              </a:ext>
+            </a:extLst>
+          </a:blip>
+          <a:srcRect/>
+          <a:stretch>
+            <a:fillRect/>
+          </a:stretch>
+        </p:blipFill>
+        <p:spPr bwMode="auto">
+          <a:xfrm>
+            <a:off x="7486607" y="5633233"/>
+            <a:ext cx="1582442" cy="791221"/>
+          </a:xfrm>
+          <a:prstGeom prst="rect">
+            <a:avLst/>
+          </a:prstGeom>
+          <a:noFill/>
+          <a:extLst>
+            <a:ext uri="{909E8E84-426E-40DD-AFC4-6F175D3DCCD1}">
+              <a14:hiddenFill xmlns:a14="http://schemas.microsoft.com/office/drawing/2010/main">
+                <a:solidFill>
+                  <a:srgbClr val="FFFFFF"/>
+                </a:solidFill>
+              </a14:hiddenFill>
+            </a:ext>
+          </a:extLst>
+        </p:spPr>
+      </p:pic>
+      <p:pic>
+        <p:nvPicPr>
+          <p:cNvPr id="2054" name="Picture 6">
+            <a:extLst>
+              <a:ext uri="{FF2B5EF4-FFF2-40B4-BE49-F238E27FC236}">
+                <a16:creationId xmlns:a16="http://schemas.microsoft.com/office/drawing/2014/main" id="{FD98CFB6-B4AA-AC41-8774-90BD2B95063A}"/>
+              </a:ext>
+            </a:extLst>
+          </p:cNvPr>
+          <p:cNvPicPr>
+            <a:picLocks noChangeAspect="1" noChangeArrowheads="1"/>
+          </p:cNvPicPr>
+          <p:nvPr/>
+        </p:nvPicPr>
+        <p:blipFill>
+          <a:blip r:embed="rId3">
             <a:extLst>
               <a:ext uri="{28A0092B-C50C-407E-A947-70E740481C1C}">
                 <a14:useLocalDpi xmlns:a14="http://schemas.microsoft.com/office/drawing/2010/main" val="0"/>
@@ -9995,7 +10042,7 @@
         <p:spPr>
           <a:xfrm>
             <a:off x="624689" y="1690688"/>
-            <a:ext cx="10601608" cy="3785652"/>
+            <a:ext cx="10601608" cy="4420890"/>
           </a:xfrm>
           <a:prstGeom prst="rect">
             <a:avLst/>
@@ -10015,28 +10062,20 @@
               <a:buChar char="•"/>
             </a:pPr>
             <a:r>
+              <a:rPr lang="en-GB" sz="2400" dirty="0" err="1">
+                <a:solidFill>
+                  <a:srgbClr val="0070C0"/>
+                </a:solidFill>
+              </a:rPr>
+              <a:t>UniProt</a:t>
+            </a:r>
+            <a:r>
               <a:rPr lang="en-GB" sz="2400" dirty="0">
                 <a:solidFill>
                   <a:srgbClr val="0070C0"/>
                 </a:solidFill>
               </a:rPr>
-              <a:t>[</a:t>
-            </a:r>
-            <a:r>
-              <a:rPr lang="en-GB" sz="2400" dirty="0" err="1">
-                <a:solidFill>
-                  <a:srgbClr val="0070C0"/>
-                </a:solidFill>
-              </a:rPr>
-              <a:t>UniProt</a:t>
-            </a:r>
-            <a:r>
-              <a:rPr lang="en-GB" sz="2400" dirty="0">
-                <a:solidFill>
-                  <a:srgbClr val="0070C0"/>
-                </a:solidFill>
-              </a:rPr>
-              <a:t>](https://www.uniprot.org/) – protein data</a:t>
+              <a:t> (https://www.uniprot.org/) – protein data</a:t>
             </a:r>
             <a:endParaRPr lang="pl-PL" sz="2400" dirty="0">
               <a:solidFill>
@@ -10058,7 +10097,7 @@
                   <a:srgbClr val="0070C0"/>
                 </a:solidFill>
               </a:rPr>
-              <a:t>[GenBank](https://www.ncbi.nlm.nih.gov/genbank/) – sequence data</a:t>
+              <a:t>GenBank (https://www.ncbi.nlm.nih.gov/genbank/) – sequence data</a:t>
             </a:r>
             <a:endParaRPr lang="pl-PL" sz="2400" dirty="0">
               <a:solidFill>
@@ -10075,28 +10114,20 @@
               <a:buChar char="•"/>
             </a:pPr>
             <a:r>
+              <a:rPr lang="en-GB" sz="2400" dirty="0" err="1">
+                <a:solidFill>
+                  <a:srgbClr val="0070C0"/>
+                </a:solidFill>
+              </a:rPr>
+              <a:t>MetaboLights</a:t>
+            </a:r>
+            <a:r>
               <a:rPr lang="en-GB" sz="2400" dirty="0">
                 <a:solidFill>
                   <a:srgbClr val="0070C0"/>
                 </a:solidFill>
               </a:rPr>
-              <a:t>[</a:t>
-            </a:r>
-            <a:r>
-              <a:rPr lang="en-GB" sz="2400" dirty="0" err="1">
-                <a:solidFill>
-                  <a:srgbClr val="0070C0"/>
-                </a:solidFill>
-              </a:rPr>
-              <a:t>MetaboLights</a:t>
-            </a:r>
-            <a:r>
-              <a:rPr lang="en-GB" sz="2400" dirty="0">
-                <a:solidFill>
-                  <a:srgbClr val="0070C0"/>
-                </a:solidFill>
-              </a:rPr>
-              <a:t>](https://www.ebi.ac.uk/metabolights/) – metabolomics data</a:t>
+              <a:t> (https://www.ebi.ac.uk/metabolights/) – metabolomics data</a:t>
             </a:r>
             <a:endParaRPr lang="pl-PL" sz="2400" dirty="0">
               <a:solidFill>
@@ -10118,7 +10149,7 @@
                   <a:srgbClr val="0070C0"/>
                 </a:solidFill>
               </a:rPr>
-              <a:t>[GitHub](https://github.com/) – for code</a:t>
+              <a:t>GitHub (https://github.com/) – for code</a:t>
             </a:r>
           </a:p>
           <a:p>
@@ -10130,28 +10161,54 @@
               <a:buChar char="•"/>
             </a:pPr>
             <a:r>
+              <a:rPr lang="en-GB" sz="2400" dirty="0" err="1">
+                <a:solidFill>
+                  <a:srgbClr val="0070C0"/>
+                </a:solidFill>
+              </a:rPr>
+              <a:t>BioImage</a:t>
+            </a:r>
+            <a:r>
               <a:rPr lang="en-GB" sz="2400" dirty="0">
                 <a:solidFill>
                   <a:srgbClr val="0070C0"/>
                 </a:solidFill>
               </a:rPr>
-              <a:t>[</a:t>
-            </a:r>
-            <a:r>
-              <a:rPr lang="en-GB" sz="2400" dirty="0" err="1">
-                <a:solidFill>
-                  <a:srgbClr val="0070C0"/>
-                </a:solidFill>
-              </a:rPr>
-              <a:t>BioImage</a:t>
-            </a:r>
+              <a:t> Archive (https://www.ebi.ac.uk/bioimage-archive/) – for images</a:t>
+            </a:r>
+          </a:p>
+          <a:p>
+            <a:pPr marL="285750" indent="-285750">
+              <a:lnSpc>
+                <a:spcPct val="200000"/>
+              </a:lnSpc>
+              <a:buFont typeface="Arial" panose="020B0604020202020204" pitchFamily="34" charset="0"/>
+              <a:buChar char="•"/>
+            </a:pPr>
             <a:r>
               <a:rPr lang="en-GB" sz="2400" dirty="0">
                 <a:solidFill>
                   <a:srgbClr val="0070C0"/>
                 </a:solidFill>
               </a:rPr>
-              <a:t> Archive](https://www.ebi.ac.uk/bioimage-archive/) – for images </a:t>
+              <a:t>Protocols.io (</a:t>
+            </a:r>
+            <a:r>
+              <a:rPr lang="en-GB" sz="2400" dirty="0">
+                <a:solidFill>
+                  <a:srgbClr val="0070C0"/>
+                </a:solidFill>
+                <a:hlinkClick r:id="rId4"/>
+              </a:rPr>
+              <a:t>https://www.protocols.io/</a:t>
+            </a:r>
+            <a:r>
+              <a:rPr lang="en-GB" sz="2400" dirty="0">
+                <a:solidFill>
+                  <a:srgbClr val="0070C0"/>
+                </a:solidFill>
+              </a:rPr>
+              <a:t>) –for protocols</a:t>
             </a:r>
           </a:p>
         </p:txBody>
@@ -10199,7 +10256,7 @@
           <p:nvPr/>
         </p:nvPicPr>
         <p:blipFill>
-          <a:blip r:embed="rId3">
+          <a:blip r:embed="rId5">
             <a:extLst>
               <a:ext uri="{28A0092B-C50C-407E-A947-70E740481C1C}">
                 <a14:useLocalDpi xmlns:a14="http://schemas.microsoft.com/office/drawing/2010/main" val="0"/>
@@ -10213,7 +10270,7 @@
         </p:blipFill>
         <p:spPr bwMode="auto">
           <a:xfrm>
-            <a:off x="7490780" y="1804416"/>
+            <a:off x="7319330" y="1750758"/>
             <a:ext cx="1688779" cy="773176"/>
           </a:xfrm>
           <a:prstGeom prst="rect">
@@ -10246,7 +10303,7 @@
           <p:nvPr/>
         </p:nvPicPr>
         <p:blipFill>
-          <a:blip r:embed="rId4">
+          <a:blip r:embed="rId6">
             <a:extLst>
               <a:ext uri="{28A0092B-C50C-407E-A947-70E740481C1C}">
                 <a14:useLocalDpi xmlns:a14="http://schemas.microsoft.com/office/drawing/2010/main" val="0"/>
@@ -10260,7 +10317,7 @@
         </p:blipFill>
         <p:spPr bwMode="auto">
           <a:xfrm>
-            <a:off x="9939785" y="2577592"/>
+            <a:off x="9537084" y="2489681"/>
             <a:ext cx="1350264" cy="675132"/>
           </a:xfrm>
           <a:prstGeom prst="rect">
@@ -10293,7 +10350,7 @@
           <p:nvPr/>
         </p:nvPicPr>
         <p:blipFill>
-          <a:blip r:embed="rId5" cstate="hqprint">
+          <a:blip r:embed="rId7" cstate="hqprint">
             <a:extLst>
               <a:ext uri="{28A0092B-C50C-407E-A947-70E740481C1C}">
                 <a14:useLocalDpi xmlns:a14="http://schemas.microsoft.com/office/drawing/2010/main" val="0"/>
@@ -10307,8 +10364,8 @@
         </p:blipFill>
         <p:spPr bwMode="auto">
           <a:xfrm>
-            <a:off x="6301740" y="3727567"/>
-            <a:ext cx="2191517" cy="1232728"/>
+            <a:off x="6139428" y="3879829"/>
+            <a:ext cx="1918434" cy="1079119"/>
           </a:xfrm>
           <a:prstGeom prst="rect">
             <a:avLst/>
@@ -10335,8 +10392,8 @@
         </p:nvGrpSpPr>
         <p:grpSpPr>
           <a:xfrm>
-            <a:off x="7414007" y="5365117"/>
-            <a:ext cx="2942569" cy="410371"/>
+            <a:off x="8795225" y="5352116"/>
+            <a:ext cx="2673696" cy="372874"/>
             <a:chOff x="3479518" y="5476339"/>
             <a:chExt cx="4011262" cy="559412"/>
           </a:xfrm>
@@ -10396,7 +10453,7 @@
             <p:nvPr/>
           </p:nvPicPr>
           <p:blipFill>
-            <a:blip r:embed="rId6"/>
+            <a:blip r:embed="rId8"/>
             <a:stretch>
               <a:fillRect/>
             </a:stretch>

</xml_diff>

<commit_message>
added slide about supp info in repo episode
</commit_message>
<xml_diff>
--- a/instructors/06-Repositories_v3.1.pptx
+++ b/instructors/06-Repositories_v3.1.pptx
@@ -5,7 +5,7 @@
     <p:sldMasterId id="2147483648" r:id="rId1"/>
   </p:sldMasterIdLst>
   <p:notesMasterIdLst>
-    <p:notesMasterId r:id="rId26"/>
+    <p:notesMasterId r:id="rId27"/>
   </p:notesMasterIdLst>
   <p:sldIdLst>
     <p:sldId id="280" r:id="rId2"/>
@@ -28,10 +28,11 @@
     <p:sldId id="307" r:id="rId19"/>
     <p:sldId id="318" r:id="rId20"/>
     <p:sldId id="319" r:id="rId21"/>
-    <p:sldId id="323" r:id="rId22"/>
-    <p:sldId id="324" r:id="rId23"/>
-    <p:sldId id="306" r:id="rId24"/>
-    <p:sldId id="296" r:id="rId25"/>
+    <p:sldId id="325" r:id="rId22"/>
+    <p:sldId id="323" r:id="rId23"/>
+    <p:sldId id="324" r:id="rId24"/>
+    <p:sldId id="306" r:id="rId25"/>
+    <p:sldId id="296" r:id="rId26"/>
   </p:sldIdLst>
   <p:sldSz cx="12192000" cy="6858000"/>
   <p:notesSz cx="6858000" cy="9144000"/>
@@ -8168,187 +8169,176 @@
       </p:grpSpPr>
       <p:sp>
         <p:nvSpPr>
-          <p:cNvPr id="2" name="Rectangle 1"/>
-          <p:cNvSpPr/>
+          <p:cNvPr id="3" name="TextBox 2">
+            <a:extLst>
+              <a:ext uri="{FF2B5EF4-FFF2-40B4-BE49-F238E27FC236}">
+                <a16:creationId xmlns:a16="http://schemas.microsoft.com/office/drawing/2014/main" id="{F8B395EA-2E17-4116-83D1-64C170ADF7D1}"/>
+              </a:ext>
+            </a:extLst>
+          </p:cNvPr>
+          <p:cNvSpPr txBox="1"/>
           <p:nvPr/>
         </p:nvSpPr>
         <p:spPr>
           <a:xfrm>
-            <a:off x="730192" y="1690688"/>
-            <a:ext cx="10981854" cy="1754326"/>
+            <a:off x="1059366" y="2207941"/>
+            <a:ext cx="8132354" cy="2246769"/>
+          </a:xfrm>
+          <a:prstGeom prst="rect">
+            <a:avLst/>
+          </a:prstGeom>
+          <a:noFill/>
+        </p:spPr>
+        <p:txBody>
+          <a:bodyPr wrap="none" rtlCol="0">
+            <a:spAutoFit/>
+          </a:bodyPr>
+          <a:lstStyle/>
+          <a:p>
+            <a:pPr>
+              <a:spcBef>
+                <a:spcPts val="600"/>
+              </a:spcBef>
+            </a:pPr>
+            <a:r>
+              <a:rPr lang="en-GB" sz="2400" dirty="0">
+                <a:solidFill>
+                  <a:schemeClr val="accent1"/>
+                </a:solidFill>
+              </a:rPr>
+              <a:t> -  Limited amount of data that can be uploaded</a:t>
+            </a:r>
+          </a:p>
+          <a:p>
+            <a:pPr marL="285750" indent="-285750">
+              <a:spcBef>
+                <a:spcPts val="600"/>
+              </a:spcBef>
+              <a:buFontTx/>
+              <a:buChar char="-"/>
+            </a:pPr>
+            <a:r>
+              <a:rPr lang="en-GB" sz="2400" dirty="0">
+                <a:solidFill>
+                  <a:schemeClr val="accent1"/>
+                </a:solidFill>
+              </a:rPr>
+              <a:t>Dataset not easily discovered on its own</a:t>
+            </a:r>
+          </a:p>
+          <a:p>
+            <a:pPr marL="285750" indent="-285750">
+              <a:spcBef>
+                <a:spcPts val="600"/>
+              </a:spcBef>
+              <a:buFontTx/>
+              <a:buChar char="-"/>
+            </a:pPr>
+            <a:r>
+              <a:rPr lang="en-GB" sz="2400" dirty="0">
+                <a:solidFill>
+                  <a:schemeClr val="accent1"/>
+                </a:solidFill>
+              </a:rPr>
+              <a:t>Publication might not be OA</a:t>
+            </a:r>
+          </a:p>
+          <a:p>
+            <a:pPr marL="285750" indent="-285750">
+              <a:spcBef>
+                <a:spcPts val="600"/>
+              </a:spcBef>
+              <a:buFontTx/>
+              <a:buChar char="-"/>
+            </a:pPr>
+            <a:r>
+              <a:rPr lang="en-GB" sz="2400" dirty="0">
+                <a:solidFill>
+                  <a:schemeClr val="accent1"/>
+                </a:solidFill>
+              </a:rPr>
+              <a:t>Does not provide a DOI for the dataset </a:t>
+            </a:r>
+          </a:p>
+          <a:p>
+            <a:pPr marL="285750" indent="-285750">
+              <a:spcBef>
+                <a:spcPts val="600"/>
+              </a:spcBef>
+              <a:buFontTx/>
+              <a:buChar char="-"/>
+            </a:pPr>
+            <a:r>
+              <a:rPr lang="en-GB" sz="2400" dirty="0">
+                <a:solidFill>
+                  <a:schemeClr val="accent1"/>
+                </a:solidFill>
+              </a:rPr>
+              <a:t>Repositories hold records that are not related to publications </a:t>
+            </a:r>
+          </a:p>
+        </p:txBody>
+      </p:sp>
+      <p:sp>
+        <p:nvSpPr>
+          <p:cNvPr id="4" name="Title 1">
+            <a:extLst>
+              <a:ext uri="{FF2B5EF4-FFF2-40B4-BE49-F238E27FC236}">
+                <a16:creationId xmlns:a16="http://schemas.microsoft.com/office/drawing/2014/main" id="{BD371B7D-557C-4738-8371-44A1DED72542}"/>
+              </a:ext>
+            </a:extLst>
+          </p:cNvPr>
+          <p:cNvSpPr txBox="1">
+            <a:spLocks/>
+          </p:cNvSpPr>
+          <p:nvPr/>
+        </p:nvSpPr>
+        <p:spPr>
+          <a:xfrm>
+            <a:off x="305637" y="369782"/>
+            <a:ext cx="11191270" cy="1325563"/>
           </a:xfrm>
           <a:prstGeom prst="rect">
             <a:avLst/>
           </a:prstGeom>
         </p:spPr>
         <p:txBody>
-          <a:bodyPr wrap="square">
-            <a:spAutoFit/>
-          </a:bodyPr>
-          <a:lstStyle/>
-          <a:p>
-            <a:pPr marL="285750" indent="-285750">
+          <a:bodyPr/>
+          <a:lstStyle>
+            <a:lvl1pPr algn="l" defTabSz="914400" rtl="0" eaLnBrk="1" latinLnBrk="0" hangingPunct="1">
               <a:lnSpc>
-                <a:spcPct val="150000"/>
+                <a:spcPct val="90000"/>
               </a:lnSpc>
-              <a:buFont typeface="Arial" panose="020B0604020202020204" pitchFamily="34" charset="0"/>
-              <a:buChar char="•"/>
-            </a:pPr>
-            <a:r>
-              <a:rPr lang="en-GB" sz="2400" dirty="0">
-                <a:solidFill>
-                  <a:srgbClr val="0070C0"/>
-                </a:solidFill>
-              </a:rPr>
-              <a:t>Repository records are another form of scientific output!</a:t>
-            </a:r>
-          </a:p>
-          <a:p>
-            <a:pPr marL="285750" indent="-285750">
-              <a:lnSpc>
-                <a:spcPct val="150000"/>
-              </a:lnSpc>
-              <a:buFont typeface="Arial" panose="020B0604020202020204" pitchFamily="34" charset="0"/>
-              <a:buChar char="•"/>
-            </a:pPr>
-            <a:r>
-              <a:rPr lang="en-GB" sz="2400" dirty="0">
-                <a:solidFill>
-                  <a:srgbClr val="0070C0"/>
-                </a:solidFill>
-              </a:rPr>
-              <a:t>Add a good Data Availability</a:t>
-            </a:r>
-            <a:r>
-              <a:rPr lang="pl-PL" sz="2400" dirty="0">
-                <a:solidFill>
-                  <a:srgbClr val="0070C0"/>
-                </a:solidFill>
-              </a:rPr>
-              <a:t> </a:t>
-            </a:r>
-            <a:r>
-              <a:rPr lang="en-GB" sz="2400" dirty="0">
-                <a:solidFill>
-                  <a:srgbClr val="0070C0"/>
-                </a:solidFill>
-              </a:rPr>
-              <a:t>Statement</a:t>
-            </a:r>
-            <a:r>
-              <a:rPr lang="pl-PL" sz="2400" dirty="0">
-                <a:solidFill>
-                  <a:srgbClr val="0070C0"/>
-                </a:solidFill>
-              </a:rPr>
-              <a:t> to your papers and list all the public </a:t>
-            </a:r>
-            <a:r>
-              <a:rPr lang="en-GB" sz="2400" dirty="0">
-                <a:solidFill>
-                  <a:srgbClr val="0070C0"/>
-                </a:solidFill>
-              </a:rPr>
-              <a:t>r</a:t>
-            </a:r>
-            <a:r>
-              <a:rPr lang="pl-PL" sz="2400" dirty="0">
-                <a:solidFill>
-                  <a:srgbClr val="0070C0"/>
-                </a:solidFill>
-              </a:rPr>
-              <a:t>ecords</a:t>
-            </a:r>
-          </a:p>
-          <a:p>
-            <a:pPr marL="285750" indent="-285750">
-              <a:lnSpc>
-                <a:spcPct val="150000"/>
-              </a:lnSpc>
-              <a:buFont typeface="Arial" panose="020B0604020202020204" pitchFamily="34" charset="0"/>
-              <a:buChar char="•"/>
-            </a:pPr>
-            <a:r>
-              <a:rPr lang="pl-PL" sz="2400" dirty="0">
-                <a:solidFill>
-                  <a:srgbClr val="0070C0"/>
-                </a:solidFill>
-              </a:rPr>
-              <a:t>List data sets in </a:t>
-            </a:r>
-            <a:r>
-              <a:rPr lang="en-GB" sz="2400" dirty="0">
-                <a:solidFill>
-                  <a:srgbClr val="0070C0"/>
-                </a:solidFill>
-              </a:rPr>
-              <a:t>your </a:t>
-            </a:r>
-            <a:r>
-              <a:rPr lang="pl-PL" sz="2400" dirty="0">
-                <a:solidFill>
-                  <a:srgbClr val="0070C0"/>
-                </a:solidFill>
-              </a:rPr>
-              <a:t>ORCID</a:t>
-            </a:r>
-            <a:r>
-              <a:rPr lang="en-GB" sz="2400" dirty="0">
-                <a:solidFill>
-                  <a:srgbClr val="0070C0"/>
-                </a:solidFill>
-              </a:rPr>
-              <a:t> record</a:t>
-            </a:r>
-          </a:p>
-        </p:txBody>
-      </p:sp>
-      <p:sp>
-        <p:nvSpPr>
-          <p:cNvPr id="5" name="Title 1">
-            <a:extLst>
-              <a:ext uri="{FF2B5EF4-FFF2-40B4-BE49-F238E27FC236}">
-                <a16:creationId xmlns:a16="http://schemas.microsoft.com/office/drawing/2014/main" id="{775BFE92-9990-4094-B7B2-01514614F16E}"/>
-              </a:ext>
-            </a:extLst>
-          </p:cNvPr>
-          <p:cNvSpPr>
-            <a:spLocks noGrp="1"/>
-          </p:cNvSpPr>
-          <p:nvPr>
-            <p:ph type="title"/>
-          </p:nvPr>
-        </p:nvSpPr>
-        <p:spPr>
-          <a:xfrm>
-            <a:off x="838200" y="365125"/>
-            <a:ext cx="10515600" cy="1325563"/>
-          </a:xfrm>
-        </p:spPr>
-        <p:txBody>
-          <a:bodyPr/>
-          <a:lstStyle/>
-          <a:p>
-            <a:r>
-              <a:rPr lang="pl-PL" dirty="0">
-                <a:solidFill>
-                  <a:srgbClr val="0070C0"/>
-                </a:solidFill>
-              </a:rPr>
-              <a:t>Repositories Summary</a:t>
-            </a:r>
-            <a:endParaRPr lang="en-GB" dirty="0">
-              <a:solidFill>
-                <a:srgbClr val="0070C0"/>
-              </a:solidFill>
-            </a:endParaRPr>
+              <a:spcBef>
+                <a:spcPct val="0"/>
+              </a:spcBef>
+              <a:buNone/>
+              <a:defRPr sz="4400" kern="1200">
+                <a:solidFill>
+                  <a:srgbClr val="0070C0"/>
+                </a:solidFill>
+                <a:latin typeface="+mj-lt"/>
+                <a:ea typeface="+mj-ea"/>
+                <a:cs typeface="+mj-cs"/>
+              </a:defRPr>
+            </a:lvl1pPr>
+          </a:lstStyle>
+          <a:p>
+            <a:r>
+              <a:rPr lang="en-GB" sz="4400" dirty="0">
+                <a:solidFill>
+                  <a:schemeClr val="accent1"/>
+                </a:solidFill>
+              </a:rPr>
+              <a:t>What about sharing data as “Supplementary Information”? </a:t>
+            </a:r>
           </a:p>
         </p:txBody>
       </p:sp>
     </p:spTree>
     <p:extLst>
       <p:ext uri="{BB962C8B-B14F-4D97-AF65-F5344CB8AC3E}">
-        <p14:creationId xmlns:p14="http://schemas.microsoft.com/office/powerpoint/2010/main" val="423763059"/>
+        <p14:creationId xmlns:p14="http://schemas.microsoft.com/office/powerpoint/2010/main" val="149315681"/>
       </p:ext>
     </p:extLst>
   </p:cSld>
@@ -8384,7 +8374,7 @@
         <p:spPr>
           <a:xfrm>
             <a:off x="730192" y="1690688"/>
-            <a:ext cx="10981854" cy="3416320"/>
+            <a:ext cx="10981854" cy="1754326"/>
           </a:xfrm>
           <a:prstGeom prst="rect">
             <a:avLst/>
@@ -8409,7 +8399,7 @@
                   <a:srgbClr val="0070C0"/>
                 </a:solidFill>
               </a:rPr>
-              <a:t>Find suitable repository(ies) as soon as data are generated</a:t>
+              <a:t>Repository records are another form of scientific output!</a:t>
             </a:r>
           </a:p>
           <a:p>
@@ -8421,28 +8411,20 @@
               <a:buChar char="•"/>
             </a:pPr>
             <a:r>
-              <a:rPr lang="en-GB" sz="2400">
-                <a:solidFill>
-                  <a:srgbClr val="0070C0"/>
-                </a:solidFill>
-              </a:rPr>
-              <a:t>If the </a:t>
-            </a:r>
-            <a:r>
               <a:rPr lang="en-GB" sz="2400" dirty="0">
                 <a:solidFill>
                   <a:srgbClr val="0070C0"/>
                 </a:solidFill>
               </a:rPr>
-              <a:t>repository </a:t>
-            </a:r>
-            <a:r>
-              <a:rPr lang="en-GB" sz="2400">
-                <a:solidFill>
-                  <a:srgbClr val="0070C0"/>
-                </a:solidFill>
-              </a:rPr>
-              <a:t>permits embargo, deposit your data </a:t>
+              <a:t>Add a good Data Availability</a:t>
+            </a:r>
+            <a:r>
+              <a:rPr lang="pl-PL" sz="2400" dirty="0">
+                <a:solidFill>
+                  <a:srgbClr val="0070C0"/>
+                </a:solidFill>
+              </a:rPr>
+              <a:t> </a:t>
             </a:r>
             <a:r>
               <a:rPr lang="en-GB" sz="2400" dirty="0">
@@ -8450,44 +8432,32 @@
                   <a:srgbClr val="0070C0"/>
                 </a:solidFill>
               </a:rPr>
-              <a:t>as soon as they are obtained </a:t>
-            </a:r>
-            <a:br>
+              <a:t>Statement</a:t>
+            </a:r>
+            <a:r>
+              <a:rPr lang="pl-PL" sz="2400" dirty="0">
+                <a:solidFill>
+                  <a:srgbClr val="0070C0"/>
+                </a:solidFill>
+              </a:rPr>
+              <a:t> to your papers and list all the public </a:t>
+            </a:r>
+            <a:r>
               <a:rPr lang="en-GB" sz="2400" dirty="0">
                 <a:solidFill>
                   <a:srgbClr val="0070C0"/>
                 </a:solidFill>
               </a:rPr>
-            </a:br>
-            <a:r>
-              <a:rPr lang="en-GB" sz="2400" dirty="0">
-                <a:solidFill>
-                  <a:srgbClr val="0070C0"/>
-                </a:solidFill>
-              </a:rPr>
-              <a:t>(especially if analysed by 3</a:t>
-            </a:r>
-            <a:r>
-              <a:rPr lang="en-GB" sz="2400" baseline="30000" dirty="0">
-                <a:solidFill>
-                  <a:srgbClr val="0070C0"/>
-                </a:solidFill>
-              </a:rPr>
-              <a:t>rd</a:t>
-            </a:r>
-            <a:r>
-              <a:rPr lang="en-GB" sz="2400" dirty="0">
-                <a:solidFill>
-                  <a:srgbClr val="0070C0"/>
-                </a:solidFill>
-              </a:rPr>
-              <a:t> party)</a:t>
-            </a:r>
-            <a:endParaRPr lang="pl-PL" sz="2400" dirty="0">
-              <a:solidFill>
-                <a:srgbClr val="0070C0"/>
-              </a:solidFill>
-            </a:endParaRPr>
+              <a:t>r</a:t>
+            </a:r>
+            <a:r>
+              <a:rPr lang="pl-PL" sz="2400" dirty="0">
+                <a:solidFill>
+                  <a:srgbClr val="0070C0"/>
+                </a:solidFill>
+              </a:rPr>
+              <a:t>ecords</a:t>
+            </a:r>
           </a:p>
           <a:p>
             <a:pPr marL="285750" indent="-285750">
@@ -8498,20 +8468,28 @@
               <a:buChar char="•"/>
             </a:pPr>
             <a:r>
+              <a:rPr lang="pl-PL" sz="2400" dirty="0">
+                <a:solidFill>
+                  <a:srgbClr val="0070C0"/>
+                </a:solidFill>
+              </a:rPr>
+              <a:t>List data sets in </a:t>
+            </a:r>
+            <a:r>
               <a:rPr lang="en-GB" sz="2400" dirty="0">
                 <a:solidFill>
                   <a:srgbClr val="0070C0"/>
                 </a:solidFill>
               </a:rPr>
-              <a:t>Deposit simultaneously to a very specialized repo and </a:t>
-            </a:r>
-            <a:r>
-              <a:rPr lang="en-GB" sz="2400">
-                <a:solidFill>
-                  <a:srgbClr val="0070C0"/>
-                </a:solidFill>
-              </a:rPr>
-              <a:t>a 'mainstream</a:t>
+              <a:t>your </a:t>
+            </a:r>
+            <a:r>
+              <a:rPr lang="pl-PL" sz="2400" dirty="0">
+                <a:solidFill>
+                  <a:srgbClr val="0070C0"/>
+                </a:solidFill>
+              </a:rPr>
+              <a:t>ORCID</a:t>
             </a:r>
             <a:r>
               <a:rPr lang="en-GB" sz="2400" dirty="0">
@@ -8519,83 +8497,8 @@
                   <a:srgbClr val="0070C0"/>
                 </a:solidFill>
               </a:rPr>
-              <a:t>'</a:t>
-            </a:r>
-            <a:r>
-              <a:rPr lang="en-GB" sz="2400">
-                <a:solidFill>
-                  <a:srgbClr val="0070C0"/>
-                </a:solidFill>
-              </a:rPr>
-              <a:t> one</a:t>
-            </a:r>
-            <a:r>
-              <a:rPr lang="pl-PL" sz="2400">
-                <a:solidFill>
-                  <a:srgbClr val="0070C0"/>
-                </a:solidFill>
-              </a:rPr>
-              <a:t> (</a:t>
-            </a:r>
-            <a:r>
-              <a:rPr lang="en-GB" sz="2400">
-                <a:solidFill>
-                  <a:srgbClr val="0070C0"/>
-                </a:solidFill>
-              </a:rPr>
-              <a:t>for </a:t>
-            </a:r>
-            <a:r>
-              <a:rPr lang="pl-PL" sz="2400">
-                <a:solidFill>
-                  <a:srgbClr val="0070C0"/>
-                </a:solidFill>
-              </a:rPr>
-              <a:t>better </a:t>
-            </a:r>
-            <a:r>
-              <a:rPr lang="en-GB" sz="2400">
-                <a:solidFill>
-                  <a:srgbClr val="0070C0"/>
-                </a:solidFill>
-              </a:rPr>
-              <a:t>findability</a:t>
-            </a:r>
-            <a:r>
-              <a:rPr lang="pl-PL" sz="2400">
-                <a:solidFill>
-                  <a:srgbClr val="0070C0"/>
-                </a:solidFill>
-              </a:rPr>
-              <a:t>)</a:t>
-            </a:r>
-            <a:endParaRPr lang="pl-PL" sz="2400" dirty="0">
-              <a:solidFill>
-                <a:srgbClr val="0070C0"/>
-              </a:solidFill>
-            </a:endParaRPr>
-          </a:p>
-          <a:p>
-            <a:pPr marL="285750" indent="-285750">
-              <a:lnSpc>
-                <a:spcPct val="150000"/>
-              </a:lnSpc>
-              <a:buFont typeface="Arial" panose="020B0604020202020204" pitchFamily="34" charset="0"/>
-              <a:buChar char="•"/>
-            </a:pPr>
-            <a:r>
-              <a:rPr lang="en-GB" sz="2400" dirty="0">
-                <a:solidFill>
-                  <a:srgbClr val="0070C0"/>
-                </a:solidFill>
-              </a:rPr>
-              <a:t>Cross link repositories’ records </a:t>
-            </a:r>
-            <a:endParaRPr lang="pl-PL" sz="2400" dirty="0">
-              <a:solidFill>
-                <a:srgbClr val="0070C0"/>
-              </a:solidFill>
-            </a:endParaRPr>
+              <a:t> record</a:t>
+            </a:r>
           </a:p>
         </p:txBody>
       </p:sp>
@@ -8644,7 +8547,7 @@
     </p:spTree>
     <p:extLst>
       <p:ext uri="{BB962C8B-B14F-4D97-AF65-F5344CB8AC3E}">
-        <p14:creationId xmlns:p14="http://schemas.microsoft.com/office/powerpoint/2010/main" val="894139397"/>
+        <p14:creationId xmlns:p14="http://schemas.microsoft.com/office/powerpoint/2010/main" val="423763059"/>
       </p:ext>
     </p:extLst>
   </p:cSld>
@@ -8671,6 +8574,302 @@
           <a:chExt cx="0" cy="0"/>
         </a:xfrm>
       </p:grpSpPr>
+      <p:sp>
+        <p:nvSpPr>
+          <p:cNvPr id="2" name="Rectangle 1"/>
+          <p:cNvSpPr/>
+          <p:nvPr/>
+        </p:nvSpPr>
+        <p:spPr>
+          <a:xfrm>
+            <a:off x="730192" y="1690688"/>
+            <a:ext cx="10981854" cy="3416320"/>
+          </a:xfrm>
+          <a:prstGeom prst="rect">
+            <a:avLst/>
+          </a:prstGeom>
+        </p:spPr>
+        <p:txBody>
+          <a:bodyPr wrap="square">
+            <a:spAutoFit/>
+          </a:bodyPr>
+          <a:lstStyle/>
+          <a:p>
+            <a:pPr marL="285750" indent="-285750">
+              <a:lnSpc>
+                <a:spcPct val="150000"/>
+              </a:lnSpc>
+              <a:buFont typeface="Arial" panose="020B0604020202020204" pitchFamily="34" charset="0"/>
+              <a:buChar char="•"/>
+            </a:pPr>
+            <a:r>
+              <a:rPr lang="en-GB" sz="2400" dirty="0">
+                <a:solidFill>
+                  <a:srgbClr val="0070C0"/>
+                </a:solidFill>
+              </a:rPr>
+              <a:t>Find suitable repository(ies) as soon as data are generated</a:t>
+            </a:r>
+          </a:p>
+          <a:p>
+            <a:pPr marL="285750" indent="-285750">
+              <a:lnSpc>
+                <a:spcPct val="150000"/>
+              </a:lnSpc>
+              <a:buFont typeface="Arial" panose="020B0604020202020204" pitchFamily="34" charset="0"/>
+              <a:buChar char="•"/>
+            </a:pPr>
+            <a:r>
+              <a:rPr lang="en-GB" sz="2400">
+                <a:solidFill>
+                  <a:srgbClr val="0070C0"/>
+                </a:solidFill>
+              </a:rPr>
+              <a:t>If the </a:t>
+            </a:r>
+            <a:r>
+              <a:rPr lang="en-GB" sz="2400" dirty="0">
+                <a:solidFill>
+                  <a:srgbClr val="0070C0"/>
+                </a:solidFill>
+              </a:rPr>
+              <a:t>repository </a:t>
+            </a:r>
+            <a:r>
+              <a:rPr lang="en-GB" sz="2400">
+                <a:solidFill>
+                  <a:srgbClr val="0070C0"/>
+                </a:solidFill>
+              </a:rPr>
+              <a:t>permits embargo, deposit your data </a:t>
+            </a:r>
+            <a:r>
+              <a:rPr lang="en-GB" sz="2400" dirty="0">
+                <a:solidFill>
+                  <a:srgbClr val="0070C0"/>
+                </a:solidFill>
+              </a:rPr>
+              <a:t>as soon as they are obtained </a:t>
+            </a:r>
+            <a:br>
+              <a:rPr lang="en-GB" sz="2400" dirty="0">
+                <a:solidFill>
+                  <a:srgbClr val="0070C0"/>
+                </a:solidFill>
+              </a:rPr>
+            </a:br>
+            <a:r>
+              <a:rPr lang="en-GB" sz="2400" dirty="0">
+                <a:solidFill>
+                  <a:srgbClr val="0070C0"/>
+                </a:solidFill>
+              </a:rPr>
+              <a:t>(especially if analysed by 3</a:t>
+            </a:r>
+            <a:r>
+              <a:rPr lang="en-GB" sz="2400" baseline="30000" dirty="0">
+                <a:solidFill>
+                  <a:srgbClr val="0070C0"/>
+                </a:solidFill>
+              </a:rPr>
+              <a:t>rd</a:t>
+            </a:r>
+            <a:r>
+              <a:rPr lang="en-GB" sz="2400" dirty="0">
+                <a:solidFill>
+                  <a:srgbClr val="0070C0"/>
+                </a:solidFill>
+              </a:rPr>
+              <a:t> party)</a:t>
+            </a:r>
+            <a:endParaRPr lang="pl-PL" sz="2400" dirty="0">
+              <a:solidFill>
+                <a:srgbClr val="0070C0"/>
+              </a:solidFill>
+            </a:endParaRPr>
+          </a:p>
+          <a:p>
+            <a:pPr marL="285750" indent="-285750">
+              <a:lnSpc>
+                <a:spcPct val="150000"/>
+              </a:lnSpc>
+              <a:buFont typeface="Arial" panose="020B0604020202020204" pitchFamily="34" charset="0"/>
+              <a:buChar char="•"/>
+            </a:pPr>
+            <a:r>
+              <a:rPr lang="en-GB" sz="2400" dirty="0">
+                <a:solidFill>
+                  <a:srgbClr val="0070C0"/>
+                </a:solidFill>
+              </a:rPr>
+              <a:t>Deposit simultaneously to a very specialized repo and </a:t>
+            </a:r>
+            <a:r>
+              <a:rPr lang="en-GB" sz="2400">
+                <a:solidFill>
+                  <a:srgbClr val="0070C0"/>
+                </a:solidFill>
+              </a:rPr>
+              <a:t>a 'mainstream</a:t>
+            </a:r>
+            <a:r>
+              <a:rPr lang="en-GB" sz="2400" dirty="0">
+                <a:solidFill>
+                  <a:srgbClr val="0070C0"/>
+                </a:solidFill>
+              </a:rPr>
+              <a:t>'</a:t>
+            </a:r>
+            <a:r>
+              <a:rPr lang="en-GB" sz="2400">
+                <a:solidFill>
+                  <a:srgbClr val="0070C0"/>
+                </a:solidFill>
+              </a:rPr>
+              <a:t> one</a:t>
+            </a:r>
+            <a:r>
+              <a:rPr lang="pl-PL" sz="2400">
+                <a:solidFill>
+                  <a:srgbClr val="0070C0"/>
+                </a:solidFill>
+              </a:rPr>
+              <a:t> (</a:t>
+            </a:r>
+            <a:r>
+              <a:rPr lang="en-GB" sz="2400">
+                <a:solidFill>
+                  <a:srgbClr val="0070C0"/>
+                </a:solidFill>
+              </a:rPr>
+              <a:t>for </a:t>
+            </a:r>
+            <a:r>
+              <a:rPr lang="pl-PL" sz="2400">
+                <a:solidFill>
+                  <a:srgbClr val="0070C0"/>
+                </a:solidFill>
+              </a:rPr>
+              <a:t>better </a:t>
+            </a:r>
+            <a:r>
+              <a:rPr lang="en-GB" sz="2400">
+                <a:solidFill>
+                  <a:srgbClr val="0070C0"/>
+                </a:solidFill>
+              </a:rPr>
+              <a:t>findability</a:t>
+            </a:r>
+            <a:r>
+              <a:rPr lang="pl-PL" sz="2400">
+                <a:solidFill>
+                  <a:srgbClr val="0070C0"/>
+                </a:solidFill>
+              </a:rPr>
+              <a:t>)</a:t>
+            </a:r>
+            <a:endParaRPr lang="pl-PL" sz="2400" dirty="0">
+              <a:solidFill>
+                <a:srgbClr val="0070C0"/>
+              </a:solidFill>
+            </a:endParaRPr>
+          </a:p>
+          <a:p>
+            <a:pPr marL="285750" indent="-285750">
+              <a:lnSpc>
+                <a:spcPct val="150000"/>
+              </a:lnSpc>
+              <a:buFont typeface="Arial" panose="020B0604020202020204" pitchFamily="34" charset="0"/>
+              <a:buChar char="•"/>
+            </a:pPr>
+            <a:r>
+              <a:rPr lang="en-GB" sz="2400" dirty="0">
+                <a:solidFill>
+                  <a:srgbClr val="0070C0"/>
+                </a:solidFill>
+              </a:rPr>
+              <a:t>Cross link repositories’ records </a:t>
+            </a:r>
+            <a:endParaRPr lang="pl-PL" sz="2400" dirty="0">
+              <a:solidFill>
+                <a:srgbClr val="0070C0"/>
+              </a:solidFill>
+            </a:endParaRPr>
+          </a:p>
+        </p:txBody>
+      </p:sp>
+      <p:sp>
+        <p:nvSpPr>
+          <p:cNvPr id="5" name="Title 1">
+            <a:extLst>
+              <a:ext uri="{FF2B5EF4-FFF2-40B4-BE49-F238E27FC236}">
+                <a16:creationId xmlns:a16="http://schemas.microsoft.com/office/drawing/2014/main" id="{775BFE92-9990-4094-B7B2-01514614F16E}"/>
+              </a:ext>
+            </a:extLst>
+          </p:cNvPr>
+          <p:cNvSpPr>
+            <a:spLocks noGrp="1"/>
+          </p:cNvSpPr>
+          <p:nvPr>
+            <p:ph type="title"/>
+          </p:nvPr>
+        </p:nvSpPr>
+        <p:spPr>
+          <a:xfrm>
+            <a:off x="838200" y="365125"/>
+            <a:ext cx="10515600" cy="1325563"/>
+          </a:xfrm>
+        </p:spPr>
+        <p:txBody>
+          <a:bodyPr/>
+          <a:lstStyle/>
+          <a:p>
+            <a:r>
+              <a:rPr lang="pl-PL" dirty="0">
+                <a:solidFill>
+                  <a:srgbClr val="0070C0"/>
+                </a:solidFill>
+              </a:rPr>
+              <a:t>Repositories Summary</a:t>
+            </a:r>
+            <a:endParaRPr lang="en-GB" dirty="0">
+              <a:solidFill>
+                <a:srgbClr val="0070C0"/>
+              </a:solidFill>
+            </a:endParaRPr>
+          </a:p>
+        </p:txBody>
+      </p:sp>
+    </p:spTree>
+    <p:extLst>
+      <p:ext uri="{BB962C8B-B14F-4D97-AF65-F5344CB8AC3E}">
+        <p14:creationId xmlns:p14="http://schemas.microsoft.com/office/powerpoint/2010/main" val="894139397"/>
+      </p:ext>
+    </p:extLst>
+  </p:cSld>
+  <p:clrMapOvr>
+    <a:masterClrMapping/>
+  </p:clrMapOvr>
+</p:sld>
+</file>
+
+<file path=ppt/slides/slide24.xml><?xml version="1.0" encoding="utf-8"?>
+<p:sld xmlns:a="http://schemas.openxmlformats.org/drawingml/2006/main" xmlns:r="http://schemas.openxmlformats.org/officeDocument/2006/relationships" xmlns:p="http://schemas.openxmlformats.org/presentationml/2006/main">
+  <p:cSld>
+    <p:spTree>
+      <p:nvGrpSpPr>
+        <p:cNvPr id="1" name=""/>
+        <p:cNvGrpSpPr/>
+        <p:nvPr/>
+      </p:nvGrpSpPr>
+      <p:grpSpPr>
+        <a:xfrm>
+          <a:off x="0" y="0"/>
+          <a:ext cx="0" cy="0"/>
+          <a:chOff x="0" y="0"/>
+          <a:chExt cx="0" cy="0"/>
+        </a:xfrm>
+      </p:grpSpPr>
       <p:pic>
         <p:nvPicPr>
           <p:cNvPr id="4" name="Picture 2" descr="Ed_DaSH">
@@ -8871,7 +9070,7 @@
 </p:sld>
 </file>
 
-<file path=ppt/slides/slide24.xml><?xml version="1.0" encoding="utf-8"?>
+<file path=ppt/slides/slide25.xml><?xml version="1.0" encoding="utf-8"?>
 <p:sld xmlns:a="http://schemas.openxmlformats.org/drawingml/2006/main" xmlns:r="http://schemas.openxmlformats.org/officeDocument/2006/relationships" xmlns:p="http://schemas.openxmlformats.org/presentationml/2006/main">
   <p:cSld>
     <p:spTree>

</xml_diff>